<commit_message>
Implementato maxStayTime observer. Quasi ultimato Sprint2
</commit_message>
<xml_diff>
--- a/DOCUMENTS/Diagrammi.pptx
+++ b/DOCUMENTS/Diagrammi.pptx
@@ -5,7 +5,7 @@
     <p:sldMasterId id="2147483648" r:id="rId1"/>
   </p:sldMasterIdLst>
   <p:notesMasterIdLst>
-    <p:notesMasterId r:id="rId7"/>
+    <p:notesMasterId r:id="rId8"/>
   </p:notesMasterIdLst>
   <p:sldIdLst>
     <p:sldId id="256" r:id="rId2"/>
@@ -13,6 +13,7 @@
     <p:sldId id="258" r:id="rId4"/>
     <p:sldId id="259" r:id="rId5"/>
     <p:sldId id="353" r:id="rId6"/>
+    <p:sldId id="354" r:id="rId7"/>
   </p:sldIdLst>
   <p:sldSz cx="12192000" cy="6858000"/>
   <p:notesSz cx="6858000" cy="9144000"/>
@@ -201,7 +202,7 @@
           <a:p>
             <a:fld id="{840E2AAB-1006-4BA7-817F-86A01148584B}" type="datetimeFigureOut">
               <a:rPr lang="it-IT" smtClean="0"/>
-              <a:t>27/06/2020</a:t>
+              <a:t>30/06/2020</a:t>
             </a:fld>
             <a:endParaRPr lang="it-IT"/>
           </a:p>
@@ -615,7 +616,7 @@
           <a:p>
             <a:fld id="{0210BBF0-42E9-4380-BF75-9938A7ED37A5}" type="datetimeFigureOut">
               <a:rPr lang="it-IT" smtClean="0"/>
-              <a:t>27/06/2020</a:t>
+              <a:t>30/06/2020</a:t>
             </a:fld>
             <a:endParaRPr lang="it-IT"/>
           </a:p>
@@ -813,7 +814,7 @@
           <a:p>
             <a:fld id="{0210BBF0-42E9-4380-BF75-9938A7ED37A5}" type="datetimeFigureOut">
               <a:rPr lang="it-IT" smtClean="0"/>
-              <a:t>27/06/2020</a:t>
+              <a:t>30/06/2020</a:t>
             </a:fld>
             <a:endParaRPr lang="it-IT"/>
           </a:p>
@@ -1021,7 +1022,7 @@
           <a:p>
             <a:fld id="{0210BBF0-42E9-4380-BF75-9938A7ED37A5}" type="datetimeFigureOut">
               <a:rPr lang="it-IT" smtClean="0"/>
-              <a:t>27/06/2020</a:t>
+              <a:t>30/06/2020</a:t>
             </a:fld>
             <a:endParaRPr lang="it-IT"/>
           </a:p>
@@ -1219,7 +1220,7 @@
           <a:p>
             <a:fld id="{0210BBF0-42E9-4380-BF75-9938A7ED37A5}" type="datetimeFigureOut">
               <a:rPr lang="it-IT" smtClean="0"/>
-              <a:t>27/06/2020</a:t>
+              <a:t>30/06/2020</a:t>
             </a:fld>
             <a:endParaRPr lang="it-IT"/>
           </a:p>
@@ -1494,7 +1495,7 @@
           <a:p>
             <a:fld id="{0210BBF0-42E9-4380-BF75-9938A7ED37A5}" type="datetimeFigureOut">
               <a:rPr lang="it-IT" smtClean="0"/>
-              <a:t>27/06/2020</a:t>
+              <a:t>30/06/2020</a:t>
             </a:fld>
             <a:endParaRPr lang="it-IT"/>
           </a:p>
@@ -1759,7 +1760,7 @@
           <a:p>
             <a:fld id="{0210BBF0-42E9-4380-BF75-9938A7ED37A5}" type="datetimeFigureOut">
               <a:rPr lang="it-IT" smtClean="0"/>
-              <a:t>27/06/2020</a:t>
+              <a:t>30/06/2020</a:t>
             </a:fld>
             <a:endParaRPr lang="it-IT"/>
           </a:p>
@@ -2171,7 +2172,7 @@
           <a:p>
             <a:fld id="{0210BBF0-42E9-4380-BF75-9938A7ED37A5}" type="datetimeFigureOut">
               <a:rPr lang="it-IT" smtClean="0"/>
-              <a:t>27/06/2020</a:t>
+              <a:t>30/06/2020</a:t>
             </a:fld>
             <a:endParaRPr lang="it-IT"/>
           </a:p>
@@ -2312,7 +2313,7 @@
           <a:p>
             <a:fld id="{0210BBF0-42E9-4380-BF75-9938A7ED37A5}" type="datetimeFigureOut">
               <a:rPr lang="it-IT" smtClean="0"/>
-              <a:t>27/06/2020</a:t>
+              <a:t>30/06/2020</a:t>
             </a:fld>
             <a:endParaRPr lang="it-IT"/>
           </a:p>
@@ -2425,7 +2426,7 @@
           <a:p>
             <a:fld id="{0210BBF0-42E9-4380-BF75-9938A7ED37A5}" type="datetimeFigureOut">
               <a:rPr lang="it-IT" smtClean="0"/>
-              <a:t>27/06/2020</a:t>
+              <a:t>30/06/2020</a:t>
             </a:fld>
             <a:endParaRPr lang="it-IT"/>
           </a:p>
@@ -2736,7 +2737,7 @@
           <a:p>
             <a:fld id="{0210BBF0-42E9-4380-BF75-9938A7ED37A5}" type="datetimeFigureOut">
               <a:rPr lang="it-IT" smtClean="0"/>
-              <a:t>27/06/2020</a:t>
+              <a:t>30/06/2020</a:t>
             </a:fld>
             <a:endParaRPr lang="it-IT"/>
           </a:p>
@@ -3024,7 +3025,7 @@
           <a:p>
             <a:fld id="{0210BBF0-42E9-4380-BF75-9938A7ED37A5}" type="datetimeFigureOut">
               <a:rPr lang="it-IT" smtClean="0"/>
-              <a:t>27/06/2020</a:t>
+              <a:t>30/06/2020</a:t>
             </a:fld>
             <a:endParaRPr lang="it-IT"/>
           </a:p>
@@ -3265,7 +3266,7 @@
           <a:p>
             <a:fld id="{0210BBF0-42E9-4380-BF75-9938A7ED37A5}" type="datetimeFigureOut">
               <a:rPr lang="it-IT" smtClean="0"/>
-              <a:t>27/06/2020</a:t>
+              <a:t>30/06/2020</a:t>
             </a:fld>
             <a:endParaRPr lang="it-IT"/>
           </a:p>
@@ -12680,7 +12681,7 @@
               <a:lstStyle/>
               <a:p>
                 <a:pPr algn="ctr"/>
-                <a:endParaRPr lang="en-GB" sz="1200">
+                <a:endParaRPr lang="en-GB" sz="1200" dirty="0">
                   <a:solidFill>
                     <a:schemeClr val="dk1"/>
                   </a:solidFill>
@@ -16910,6 +16911,3013 @@
 </p:sld>
 </file>
 
+<file path=ppt/slides/slide6.xml><?xml version="1.0" encoding="utf-8"?>
+<p:sld xmlns:a="http://schemas.openxmlformats.org/drawingml/2006/main" xmlns:r="http://schemas.openxmlformats.org/officeDocument/2006/relationships" xmlns:p="http://schemas.openxmlformats.org/presentationml/2006/main">
+  <p:cSld>
+    <p:spTree>
+      <p:nvGrpSpPr>
+        <p:cNvPr id="1" name=""/>
+        <p:cNvGrpSpPr/>
+        <p:nvPr/>
+      </p:nvGrpSpPr>
+      <p:grpSpPr>
+        <a:xfrm>
+          <a:off x="0" y="0"/>
+          <a:ext cx="0" cy="0"/>
+          <a:chOff x="0" y="0"/>
+          <a:chExt cx="0" cy="0"/>
+        </a:xfrm>
+      </p:grpSpPr>
+      <p:sp>
+        <p:nvSpPr>
+          <p:cNvPr id="69" name="CasellaDiTesto 68">
+            <a:extLst>
+              <a:ext uri="{FF2B5EF4-FFF2-40B4-BE49-F238E27FC236}">
+                <a16:creationId xmlns:a16="http://schemas.microsoft.com/office/drawing/2014/main" id="{FAA2BD5C-EA3B-4B02-8741-CBAAC3462CBF}"/>
+              </a:ext>
+            </a:extLst>
+          </p:cNvPr>
+          <p:cNvSpPr txBox="1"/>
+          <p:nvPr/>
+        </p:nvSpPr>
+        <p:spPr>
+          <a:xfrm>
+            <a:off x="284493" y="297300"/>
+            <a:ext cx="3251496" cy="646331"/>
+          </a:xfrm>
+          <a:prstGeom prst="rect">
+            <a:avLst/>
+          </a:prstGeom>
+          <a:noFill/>
+          <a:ln>
+            <a:solidFill>
+              <a:schemeClr val="accent1"/>
+            </a:solidFill>
+          </a:ln>
+        </p:spPr>
+        <p:txBody>
+          <a:bodyPr wrap="square" rtlCol="0">
+            <a:spAutoFit/>
+          </a:bodyPr>
+          <a:lstStyle/>
+          <a:p>
+            <a:r>
+              <a:rPr lang="it-IT" dirty="0"/>
+              <a:t>SPRINT2</a:t>
+            </a:r>
+          </a:p>
+          <a:p>
+            <a:r>
+              <a:rPr lang="it-IT" dirty="0"/>
+              <a:t>Architettura Logica</a:t>
+            </a:r>
+          </a:p>
+        </p:txBody>
+      </p:sp>
+      <p:grpSp>
+        <p:nvGrpSpPr>
+          <p:cNvPr id="110" name="Gruppo 109">
+            <a:extLst>
+              <a:ext uri="{FF2B5EF4-FFF2-40B4-BE49-F238E27FC236}">
+                <a16:creationId xmlns:a16="http://schemas.microsoft.com/office/drawing/2014/main" id="{F846BEF0-0F98-4489-835D-393FC91E382C}"/>
+              </a:ext>
+            </a:extLst>
+          </p:cNvPr>
+          <p:cNvGrpSpPr/>
+          <p:nvPr/>
+        </p:nvGrpSpPr>
+        <p:grpSpPr>
+          <a:xfrm>
+            <a:off x="1047142" y="1584056"/>
+            <a:ext cx="10097715" cy="3689888"/>
+            <a:chOff x="113085" y="1420592"/>
+            <a:chExt cx="11570531" cy="4280687"/>
+          </a:xfrm>
+        </p:grpSpPr>
+        <p:grpSp>
+          <p:nvGrpSpPr>
+            <p:cNvPr id="5" name="Gruppo 4">
+              <a:extLst>
+                <a:ext uri="{FF2B5EF4-FFF2-40B4-BE49-F238E27FC236}">
+                  <a16:creationId xmlns:a16="http://schemas.microsoft.com/office/drawing/2014/main" id="{CCB2259A-136F-4FC8-A98F-09F9B8EC5F83}"/>
+                </a:ext>
+              </a:extLst>
+            </p:cNvPr>
+            <p:cNvGrpSpPr/>
+            <p:nvPr/>
+          </p:nvGrpSpPr>
+          <p:grpSpPr>
+            <a:xfrm>
+              <a:off x="9986749" y="1979821"/>
+              <a:ext cx="1696867" cy="1234655"/>
+              <a:chOff x="2460219" y="2004003"/>
+              <a:chExt cx="1696867" cy="1234655"/>
+            </a:xfrm>
+          </p:grpSpPr>
+          <p:sp>
+            <p:nvSpPr>
+              <p:cNvPr id="6" name="Triangolo isoscele 5">
+                <a:extLst>
+                  <a:ext uri="{FF2B5EF4-FFF2-40B4-BE49-F238E27FC236}">
+                    <a16:creationId xmlns:a16="http://schemas.microsoft.com/office/drawing/2014/main" id="{DB68498C-9CC5-4A38-9BCB-02DAB3B8E45F}"/>
+                  </a:ext>
+                </a:extLst>
+              </p:cNvPr>
+              <p:cNvSpPr/>
+              <p:nvPr/>
+            </p:nvSpPr>
+            <p:spPr>
+              <a:xfrm rot="5400000">
+                <a:off x="3220535" y="2242777"/>
+                <a:ext cx="998084" cy="875019"/>
+              </a:xfrm>
+              <a:prstGeom prst="triangle">
+                <a:avLst/>
+              </a:prstGeom>
+              <a:solidFill>
+                <a:srgbClr val="CCFF66"/>
+              </a:solidFill>
+              <a:ln/>
+            </p:spPr>
+            <p:style>
+              <a:lnRef idx="1">
+                <a:schemeClr val="accent5"/>
+              </a:lnRef>
+              <a:fillRef idx="2">
+                <a:schemeClr val="accent5"/>
+              </a:fillRef>
+              <a:effectRef idx="1">
+                <a:schemeClr val="accent5"/>
+              </a:effectRef>
+              <a:fontRef idx="minor">
+                <a:schemeClr val="dk1"/>
+              </a:fontRef>
+            </p:style>
+            <p:txBody>
+              <a:bodyPr rtlCol="0" anchor="ctr"/>
+              <a:lstStyle/>
+              <a:p>
+                <a:pPr algn="ctr"/>
+                <a:endParaRPr lang="en-GB" sz="1200">
+                  <a:solidFill>
+                    <a:schemeClr val="dk1"/>
+                  </a:solidFill>
+                </a:endParaRPr>
+              </a:p>
+            </p:txBody>
+          </p:sp>
+          <p:grpSp>
+            <p:nvGrpSpPr>
+              <p:cNvPr id="7" name="Gruppo 82">
+                <a:extLst>
+                  <a:ext uri="{FF2B5EF4-FFF2-40B4-BE49-F238E27FC236}">
+                    <a16:creationId xmlns:a16="http://schemas.microsoft.com/office/drawing/2014/main" id="{03711F09-1510-4BE0-950D-178D02A9CCE3}"/>
+                  </a:ext>
+                </a:extLst>
+              </p:cNvPr>
+              <p:cNvGrpSpPr/>
+              <p:nvPr/>
+            </p:nvGrpSpPr>
+            <p:grpSpPr>
+              <a:xfrm>
+                <a:off x="2460219" y="2004003"/>
+                <a:ext cx="1409184" cy="1234655"/>
+                <a:chOff x="1194666" y="2417771"/>
+                <a:chExt cx="866156" cy="763297"/>
+              </a:xfrm>
+            </p:grpSpPr>
+            <p:sp>
+              <p:nvSpPr>
+                <p:cNvPr id="9" name="Ovale 38">
+                  <a:extLst>
+                    <a:ext uri="{FF2B5EF4-FFF2-40B4-BE49-F238E27FC236}">
+                      <a16:creationId xmlns:a16="http://schemas.microsoft.com/office/drawing/2014/main" id="{A8681FB9-5108-4504-B8F9-14DD9B8DA9F2}"/>
+                    </a:ext>
+                  </a:extLst>
+                </p:cNvPr>
+                <p:cNvSpPr/>
+                <p:nvPr/>
+              </p:nvSpPr>
+              <p:spPr>
+                <a:xfrm>
+                  <a:off x="1311101" y="2460988"/>
+                  <a:ext cx="749721" cy="720080"/>
+                </a:xfrm>
+                <a:prstGeom prst="ellipse">
+                  <a:avLst/>
+                </a:prstGeom>
+                <a:solidFill>
+                  <a:srgbClr val="FFCCFF"/>
+                </a:solidFill>
+                <a:ln/>
+              </p:spPr>
+              <p:style>
+                <a:lnRef idx="1">
+                  <a:schemeClr val="accent5"/>
+                </a:lnRef>
+                <a:fillRef idx="2">
+                  <a:schemeClr val="accent5"/>
+                </a:fillRef>
+                <a:effectRef idx="1">
+                  <a:schemeClr val="accent5"/>
+                </a:effectRef>
+                <a:fontRef idx="minor">
+                  <a:schemeClr val="dk1"/>
+                </a:fontRef>
+              </p:style>
+              <p:txBody>
+                <a:bodyPr rtlCol="0" anchor="ctr"/>
+                <a:lstStyle/>
+                <a:p>
+                  <a:pPr algn="ctr"/>
+                  <a:r>
+                    <a:rPr lang="en-GB" sz="1200" dirty="0"/>
+                    <a:t> </a:t>
+                  </a:r>
+                </a:p>
+              </p:txBody>
+            </p:sp>
+            <p:sp>
+              <p:nvSpPr>
+                <p:cNvPr id="10" name="Rettangolo 39">
+                  <a:extLst>
+                    <a:ext uri="{FF2B5EF4-FFF2-40B4-BE49-F238E27FC236}">
+                      <a16:creationId xmlns:a16="http://schemas.microsoft.com/office/drawing/2014/main" id="{C09FB3C0-F6B9-4AEF-8DC4-A83B9ACC1969}"/>
+                    </a:ext>
+                  </a:extLst>
+                </p:cNvPr>
+                <p:cNvSpPr/>
+                <p:nvPr/>
+              </p:nvSpPr>
+              <p:spPr>
+                <a:xfrm>
+                  <a:off x="1194666" y="2699711"/>
+                  <a:ext cx="281433" cy="211952"/>
+                </a:xfrm>
+                <a:prstGeom prst="rect">
+                  <a:avLst/>
+                </a:prstGeom>
+                <a:solidFill>
+                  <a:srgbClr val="FFCCFF"/>
+                </a:solidFill>
+                <a:ln/>
+              </p:spPr>
+              <p:style>
+                <a:lnRef idx="1">
+                  <a:schemeClr val="accent5"/>
+                </a:lnRef>
+                <a:fillRef idx="2">
+                  <a:schemeClr val="accent5"/>
+                </a:fillRef>
+                <a:effectRef idx="1">
+                  <a:schemeClr val="accent5"/>
+                </a:effectRef>
+                <a:fontRef idx="minor">
+                  <a:schemeClr val="dk1"/>
+                </a:fontRef>
+              </p:style>
+              <p:txBody>
+                <a:bodyPr rtlCol="0" anchor="ctr"/>
+                <a:lstStyle/>
+                <a:p>
+                  <a:pPr algn="ctr"/>
+                  <a:endParaRPr lang="en-GB" sz="1200"/>
+                </a:p>
+              </p:txBody>
+            </p:sp>
+            <p:sp>
+              <p:nvSpPr>
+                <p:cNvPr id="11" name="Triangolo isoscele 42">
+                  <a:extLst>
+                    <a:ext uri="{FF2B5EF4-FFF2-40B4-BE49-F238E27FC236}">
+                      <a16:creationId xmlns:a16="http://schemas.microsoft.com/office/drawing/2014/main" id="{E4062397-D89C-4F19-8E7A-A269C9A311C2}"/>
+                    </a:ext>
+                  </a:extLst>
+                </p:cNvPr>
+                <p:cNvSpPr/>
+                <p:nvPr/>
+              </p:nvSpPr>
+              <p:spPr>
+                <a:xfrm rot="16200000">
+                  <a:off x="1618539" y="2391356"/>
+                  <a:ext cx="86434" cy="139263"/>
+                </a:xfrm>
+                <a:prstGeom prst="triangle">
+                  <a:avLst/>
+                </a:prstGeom>
+                <a:solidFill>
+                  <a:srgbClr val="FF0000"/>
+                </a:solidFill>
+                <a:ln/>
+              </p:spPr>
+              <p:style>
+                <a:lnRef idx="1">
+                  <a:schemeClr val="accent5"/>
+                </a:lnRef>
+                <a:fillRef idx="2">
+                  <a:schemeClr val="accent5"/>
+                </a:fillRef>
+                <a:effectRef idx="1">
+                  <a:schemeClr val="accent5"/>
+                </a:effectRef>
+                <a:fontRef idx="minor">
+                  <a:schemeClr val="dk1"/>
+                </a:fontRef>
+              </p:style>
+              <p:txBody>
+                <a:bodyPr rtlCol="0" anchor="ctr"/>
+                <a:lstStyle/>
+                <a:p>
+                  <a:pPr algn="ctr"/>
+                  <a:endParaRPr lang="en-GB" sz="1200">
+                    <a:solidFill>
+                      <a:schemeClr val="dk1"/>
+                    </a:solidFill>
+                  </a:endParaRPr>
+                </a:p>
+              </p:txBody>
+            </p:sp>
+          </p:grpSp>
+          <p:sp>
+            <p:nvSpPr>
+              <p:cNvPr id="8" name="Rettangolo 7">
+                <a:extLst>
+                  <a:ext uri="{FF2B5EF4-FFF2-40B4-BE49-F238E27FC236}">
+                    <a16:creationId xmlns:a16="http://schemas.microsoft.com/office/drawing/2014/main" id="{28EB2732-E0D8-45E9-8BE9-68617370B196}"/>
+                  </a:ext>
+                </a:extLst>
+              </p:cNvPr>
+              <p:cNvSpPr/>
+              <p:nvPr/>
+            </p:nvSpPr>
+            <p:spPr>
+              <a:xfrm>
+                <a:off x="2697729" y="2458538"/>
+                <a:ext cx="1044838" cy="369332"/>
+              </a:xfrm>
+              <a:prstGeom prst="rect">
+                <a:avLst/>
+              </a:prstGeom>
+            </p:spPr>
+            <p:txBody>
+              <a:bodyPr wrap="none">
+                <a:spAutoFit/>
+              </a:bodyPr>
+              <a:lstStyle/>
+              <a:p>
+                <a:r>
+                  <a:rPr lang="en-GB" dirty="0" err="1"/>
+                  <a:t>basicrobot</a:t>
+                </a:r>
+                <a:endParaRPr lang="en-GB" dirty="0"/>
+              </a:p>
+            </p:txBody>
+          </p:sp>
+        </p:grpSp>
+        <p:sp>
+          <p:nvSpPr>
+            <p:cNvPr id="15" name="CasellaDiTesto 67">
+              <a:extLst>
+                <a:ext uri="{FF2B5EF4-FFF2-40B4-BE49-F238E27FC236}">
+                  <a16:creationId xmlns:a16="http://schemas.microsoft.com/office/drawing/2014/main" id="{A289E2A0-5DB5-45C4-81F2-CD29D1A80D84}"/>
+                </a:ext>
+              </a:extLst>
+            </p:cNvPr>
+            <p:cNvSpPr txBox="1"/>
+            <p:nvPr/>
+          </p:nvSpPr>
+          <p:spPr>
+            <a:xfrm>
+              <a:off x="8911529" y="2109758"/>
+              <a:ext cx="568970" cy="357056"/>
+            </a:xfrm>
+            <a:prstGeom prst="rect">
+              <a:avLst/>
+            </a:prstGeom>
+            <a:noFill/>
+          </p:spPr>
+          <p:txBody>
+            <a:bodyPr wrap="none" rtlCol="0">
+              <a:spAutoFit/>
+            </a:bodyPr>
+            <a:lstStyle/>
+            <a:p>
+              <a:r>
+                <a:rPr lang="it-IT" sz="1400" dirty="0"/>
+                <a:t>step</a:t>
+              </a:r>
+              <a:endParaRPr lang="en-GB" sz="2000" dirty="0"/>
+            </a:p>
+          </p:txBody>
+        </p:sp>
+        <p:grpSp>
+          <p:nvGrpSpPr>
+            <p:cNvPr id="16" name="Gruppo 75">
+              <a:extLst>
+                <a:ext uri="{FF2B5EF4-FFF2-40B4-BE49-F238E27FC236}">
+                  <a16:creationId xmlns:a16="http://schemas.microsoft.com/office/drawing/2014/main" id="{B7461CAE-55E6-48E0-A09A-38BD98B3389D}"/>
+                </a:ext>
+              </a:extLst>
+            </p:cNvPr>
+            <p:cNvGrpSpPr/>
+            <p:nvPr/>
+          </p:nvGrpSpPr>
+          <p:grpSpPr>
+            <a:xfrm rot="1719965" flipH="1">
+              <a:off x="9879938" y="1698267"/>
+              <a:ext cx="592487" cy="258092"/>
+              <a:chOff x="5133975" y="5295900"/>
+              <a:chExt cx="342900" cy="238125"/>
+            </a:xfrm>
+          </p:grpSpPr>
+          <p:sp>
+            <p:nvSpPr>
+              <p:cNvPr id="17" name="Figura a mano libera 76">
+                <a:extLst>
+                  <a:ext uri="{FF2B5EF4-FFF2-40B4-BE49-F238E27FC236}">
+                    <a16:creationId xmlns:a16="http://schemas.microsoft.com/office/drawing/2014/main" id="{AF88C660-A346-4976-9939-2E20DF9E568A}"/>
+                  </a:ext>
+                </a:extLst>
+              </p:cNvPr>
+              <p:cNvSpPr/>
+              <p:nvPr/>
+            </p:nvSpPr>
+            <p:spPr>
+              <a:xfrm>
+                <a:off x="5133975" y="5295900"/>
+                <a:ext cx="342900" cy="238125"/>
+              </a:xfrm>
+              <a:custGeom>
+                <a:avLst/>
+                <a:gdLst>
+                  <a:gd name="connsiteX0" fmla="*/ 0 w 342900"/>
+                  <a:gd name="connsiteY0" fmla="*/ 142875 h 238125"/>
+                  <a:gd name="connsiteX1" fmla="*/ 28575 w 342900"/>
+                  <a:gd name="connsiteY1" fmla="*/ 38100 h 238125"/>
+                  <a:gd name="connsiteX2" fmla="*/ 47625 w 342900"/>
+                  <a:gd name="connsiteY2" fmla="*/ 9525 h 238125"/>
+                  <a:gd name="connsiteX3" fmla="*/ 76200 w 342900"/>
+                  <a:gd name="connsiteY3" fmla="*/ 0 h 238125"/>
+                  <a:gd name="connsiteX4" fmla="*/ 104775 w 342900"/>
+                  <a:gd name="connsiteY4" fmla="*/ 9525 h 238125"/>
+                  <a:gd name="connsiteX5" fmla="*/ 142875 w 342900"/>
+                  <a:gd name="connsiteY5" fmla="*/ 95250 h 238125"/>
+                  <a:gd name="connsiteX6" fmla="*/ 161925 w 342900"/>
+                  <a:gd name="connsiteY6" fmla="*/ 152400 h 238125"/>
+                  <a:gd name="connsiteX7" fmla="*/ 171450 w 342900"/>
+                  <a:gd name="connsiteY7" fmla="*/ 180975 h 238125"/>
+                  <a:gd name="connsiteX8" fmla="*/ 209550 w 342900"/>
+                  <a:gd name="connsiteY8" fmla="*/ 238125 h 238125"/>
+                  <a:gd name="connsiteX9" fmla="*/ 238125 w 342900"/>
+                  <a:gd name="connsiteY9" fmla="*/ 180975 h 238125"/>
+                  <a:gd name="connsiteX10" fmla="*/ 266700 w 342900"/>
+                  <a:gd name="connsiteY10" fmla="*/ 104775 h 238125"/>
+                  <a:gd name="connsiteX11" fmla="*/ 342900 w 342900"/>
+                  <a:gd name="connsiteY11" fmla="*/ 85725 h 238125"/>
+                </a:gdLst>
+                <a:ahLst/>
+                <a:cxnLst>
+                  <a:cxn ang="0">
+                    <a:pos x="connsiteX0" y="connsiteY0"/>
+                  </a:cxn>
+                  <a:cxn ang="0">
+                    <a:pos x="connsiteX1" y="connsiteY1"/>
+                  </a:cxn>
+                  <a:cxn ang="0">
+                    <a:pos x="connsiteX2" y="connsiteY2"/>
+                  </a:cxn>
+                  <a:cxn ang="0">
+                    <a:pos x="connsiteX3" y="connsiteY3"/>
+                  </a:cxn>
+                  <a:cxn ang="0">
+                    <a:pos x="connsiteX4" y="connsiteY4"/>
+                  </a:cxn>
+                  <a:cxn ang="0">
+                    <a:pos x="connsiteX5" y="connsiteY5"/>
+                  </a:cxn>
+                  <a:cxn ang="0">
+                    <a:pos x="connsiteX6" y="connsiteY6"/>
+                  </a:cxn>
+                  <a:cxn ang="0">
+                    <a:pos x="connsiteX7" y="connsiteY7"/>
+                  </a:cxn>
+                  <a:cxn ang="0">
+                    <a:pos x="connsiteX8" y="connsiteY8"/>
+                  </a:cxn>
+                  <a:cxn ang="0">
+                    <a:pos x="connsiteX9" y="connsiteY9"/>
+                  </a:cxn>
+                  <a:cxn ang="0">
+                    <a:pos x="connsiteX10" y="connsiteY10"/>
+                  </a:cxn>
+                  <a:cxn ang="0">
+                    <a:pos x="connsiteX11" y="connsiteY11"/>
+                  </a:cxn>
+                </a:cxnLst>
+                <a:rect l="l" t="t" r="r" b="b"/>
+                <a:pathLst>
+                  <a:path w="342900" h="238125">
+                    <a:moveTo>
+                      <a:pt x="0" y="142875"/>
+                    </a:moveTo>
+                    <a:cubicBezTo>
+                      <a:pt x="5112" y="117315"/>
+                      <a:pt x="14764" y="58817"/>
+                      <a:pt x="28575" y="38100"/>
+                    </a:cubicBezTo>
+                    <a:cubicBezTo>
+                      <a:pt x="34925" y="28575"/>
+                      <a:pt x="38686" y="16676"/>
+                      <a:pt x="47625" y="9525"/>
+                    </a:cubicBezTo>
+                    <a:cubicBezTo>
+                      <a:pt x="55465" y="3253"/>
+                      <a:pt x="66675" y="3175"/>
+                      <a:pt x="76200" y="0"/>
+                    </a:cubicBezTo>
+                    <a:cubicBezTo>
+                      <a:pt x="85725" y="3175"/>
+                      <a:pt x="96935" y="3253"/>
+                      <a:pt x="104775" y="9525"/>
+                    </a:cubicBezTo>
+                    <a:cubicBezTo>
+                      <a:pt x="125358" y="25992"/>
+                      <a:pt x="137054" y="77787"/>
+                      <a:pt x="142875" y="95250"/>
+                    </a:cubicBezTo>
+                    <a:lnTo>
+                      <a:pt x="161925" y="152400"/>
+                    </a:lnTo>
+                    <a:cubicBezTo>
+                      <a:pt x="165100" y="161925"/>
+                      <a:pt x="169481" y="171130"/>
+                      <a:pt x="171450" y="180975"/>
+                    </a:cubicBezTo>
+                    <a:cubicBezTo>
+                      <a:pt x="182944" y="238445"/>
+                      <a:pt x="165616" y="223480"/>
+                      <a:pt x="209550" y="238125"/>
+                    </a:cubicBezTo>
+                    <a:cubicBezTo>
+                      <a:pt x="228174" y="210189"/>
+                      <a:pt x="230238" y="212523"/>
+                      <a:pt x="238125" y="180975"/>
+                    </a:cubicBezTo>
+                    <a:cubicBezTo>
+                      <a:pt x="243105" y="161054"/>
+                      <a:pt x="243471" y="119293"/>
+                      <a:pt x="266700" y="104775"/>
+                    </a:cubicBezTo>
+                    <a:cubicBezTo>
+                      <a:pt x="300393" y="83717"/>
+                      <a:pt x="313092" y="85725"/>
+                      <a:pt x="342900" y="85725"/>
+                    </a:cubicBezTo>
+                  </a:path>
+                </a:pathLst>
+              </a:custGeom>
+              <a:noFill/>
+              <a:ln>
+                <a:solidFill>
+                  <a:srgbClr val="C00000"/>
+                </a:solidFill>
+              </a:ln>
+            </p:spPr>
+            <p:style>
+              <a:lnRef idx="2">
+                <a:schemeClr val="accent1">
+                  <a:shade val="50000"/>
+                </a:schemeClr>
+              </a:lnRef>
+              <a:fillRef idx="1">
+                <a:schemeClr val="accent1"/>
+              </a:fillRef>
+              <a:effectRef idx="0">
+                <a:schemeClr val="accent1"/>
+              </a:effectRef>
+              <a:fontRef idx="minor">
+                <a:schemeClr val="lt1"/>
+              </a:fontRef>
+            </p:style>
+            <p:txBody>
+              <a:bodyPr rtlCol="0" anchor="ctr"/>
+              <a:lstStyle/>
+              <a:p>
+                <a:pPr algn="ctr"/>
+                <a:endParaRPr lang="it-IT"/>
+              </a:p>
+            </p:txBody>
+          </p:sp>
+          <p:sp>
+            <p:nvSpPr>
+              <p:cNvPr id="18" name="Figura a mano libera 77">
+                <a:extLst>
+                  <a:ext uri="{FF2B5EF4-FFF2-40B4-BE49-F238E27FC236}">
+                    <a16:creationId xmlns:a16="http://schemas.microsoft.com/office/drawing/2014/main" id="{850A228D-0D00-4297-B0B0-4BF428A56763}"/>
+                  </a:ext>
+                </a:extLst>
+              </p:cNvPr>
+              <p:cNvSpPr/>
+              <p:nvPr/>
+            </p:nvSpPr>
+            <p:spPr>
+              <a:xfrm>
+                <a:off x="5400675" y="5353050"/>
+                <a:ext cx="66675" cy="38100"/>
+              </a:xfrm>
+              <a:custGeom>
+                <a:avLst/>
+                <a:gdLst>
+                  <a:gd name="connsiteX0" fmla="*/ 66675 w 66675"/>
+                  <a:gd name="connsiteY0" fmla="*/ 38100 h 38100"/>
+                  <a:gd name="connsiteX1" fmla="*/ 0 w 66675"/>
+                  <a:gd name="connsiteY1" fmla="*/ 0 h 38100"/>
+                </a:gdLst>
+                <a:ahLst/>
+                <a:cxnLst>
+                  <a:cxn ang="0">
+                    <a:pos x="connsiteX0" y="connsiteY0"/>
+                  </a:cxn>
+                  <a:cxn ang="0">
+                    <a:pos x="connsiteX1" y="connsiteY1"/>
+                  </a:cxn>
+                </a:cxnLst>
+                <a:rect l="l" t="t" r="r" b="b"/>
+                <a:pathLst>
+                  <a:path w="66675" h="38100">
+                    <a:moveTo>
+                      <a:pt x="66675" y="38100"/>
+                    </a:moveTo>
+                    <a:cubicBezTo>
+                      <a:pt x="12962" y="5872"/>
+                      <a:pt x="35609" y="17804"/>
+                      <a:pt x="0" y="0"/>
+                    </a:cubicBezTo>
+                  </a:path>
+                </a:pathLst>
+              </a:custGeom>
+              <a:noFill/>
+              <a:ln>
+                <a:solidFill>
+                  <a:srgbClr val="C00000"/>
+                </a:solidFill>
+              </a:ln>
+            </p:spPr>
+            <p:style>
+              <a:lnRef idx="2">
+                <a:schemeClr val="accent1">
+                  <a:shade val="50000"/>
+                </a:schemeClr>
+              </a:lnRef>
+              <a:fillRef idx="1">
+                <a:schemeClr val="accent1"/>
+              </a:fillRef>
+              <a:effectRef idx="0">
+                <a:schemeClr val="accent1"/>
+              </a:effectRef>
+              <a:fontRef idx="minor">
+                <a:schemeClr val="lt1"/>
+              </a:fontRef>
+            </p:style>
+            <p:txBody>
+              <a:bodyPr rtlCol="0" anchor="ctr"/>
+              <a:lstStyle/>
+              <a:p>
+                <a:pPr algn="ctr"/>
+                <a:endParaRPr lang="it-IT"/>
+              </a:p>
+            </p:txBody>
+          </p:sp>
+          <p:sp>
+            <p:nvSpPr>
+              <p:cNvPr id="19" name="Figura a mano libera 78">
+                <a:extLst>
+                  <a:ext uri="{FF2B5EF4-FFF2-40B4-BE49-F238E27FC236}">
+                    <a16:creationId xmlns:a16="http://schemas.microsoft.com/office/drawing/2014/main" id="{5F599F88-E310-477F-A4FF-8705FEC865AD}"/>
+                  </a:ext>
+                </a:extLst>
+              </p:cNvPr>
+              <p:cNvSpPr/>
+              <p:nvPr/>
+            </p:nvSpPr>
+            <p:spPr>
+              <a:xfrm>
+                <a:off x="5419725" y="5381625"/>
+                <a:ext cx="47625" cy="57150"/>
+              </a:xfrm>
+              <a:custGeom>
+                <a:avLst/>
+                <a:gdLst>
+                  <a:gd name="connsiteX0" fmla="*/ 47625 w 47625"/>
+                  <a:gd name="connsiteY0" fmla="*/ 0 h 57150"/>
+                  <a:gd name="connsiteX1" fmla="*/ 0 w 47625"/>
+                  <a:gd name="connsiteY1" fmla="*/ 57150 h 57150"/>
+                </a:gdLst>
+                <a:ahLst/>
+                <a:cxnLst>
+                  <a:cxn ang="0">
+                    <a:pos x="connsiteX0" y="connsiteY0"/>
+                  </a:cxn>
+                  <a:cxn ang="0">
+                    <a:pos x="connsiteX1" y="connsiteY1"/>
+                  </a:cxn>
+                </a:cxnLst>
+                <a:rect l="l" t="t" r="r" b="b"/>
+                <a:pathLst>
+                  <a:path w="47625" h="57150">
+                    <a:moveTo>
+                      <a:pt x="47625" y="0"/>
+                    </a:moveTo>
+                    <a:cubicBezTo>
+                      <a:pt x="15397" y="53713"/>
+                      <a:pt x="35609" y="39346"/>
+                      <a:pt x="0" y="57150"/>
+                    </a:cubicBezTo>
+                  </a:path>
+                </a:pathLst>
+              </a:custGeom>
+              <a:noFill/>
+              <a:ln>
+                <a:solidFill>
+                  <a:srgbClr val="C00000"/>
+                </a:solidFill>
+              </a:ln>
+            </p:spPr>
+            <p:style>
+              <a:lnRef idx="2">
+                <a:schemeClr val="accent1">
+                  <a:shade val="50000"/>
+                </a:schemeClr>
+              </a:lnRef>
+              <a:fillRef idx="1">
+                <a:schemeClr val="accent1"/>
+              </a:fillRef>
+              <a:effectRef idx="0">
+                <a:schemeClr val="accent1"/>
+              </a:effectRef>
+              <a:fontRef idx="minor">
+                <a:schemeClr val="lt1"/>
+              </a:fontRef>
+            </p:style>
+            <p:txBody>
+              <a:bodyPr rtlCol="0" anchor="ctr"/>
+              <a:lstStyle/>
+              <a:p>
+                <a:pPr algn="ctr"/>
+                <a:endParaRPr lang="it-IT"/>
+              </a:p>
+            </p:txBody>
+          </p:sp>
+        </p:grpSp>
+        <p:sp>
+          <p:nvSpPr>
+            <p:cNvPr id="20" name="Rettangolo 79">
+              <a:extLst>
+                <a:ext uri="{FF2B5EF4-FFF2-40B4-BE49-F238E27FC236}">
+                  <a16:creationId xmlns:a16="http://schemas.microsoft.com/office/drawing/2014/main" id="{8B0D73E3-6D7D-4139-8849-7EEFFDA0F0FA}"/>
+                </a:ext>
+              </a:extLst>
+            </p:cNvPr>
+            <p:cNvSpPr/>
+            <p:nvPr/>
+          </p:nvSpPr>
+          <p:spPr>
+            <a:xfrm>
+              <a:off x="10174296" y="1420592"/>
+              <a:ext cx="793551" cy="307777"/>
+            </a:xfrm>
+            <a:prstGeom prst="rect">
+              <a:avLst/>
+            </a:prstGeom>
+          </p:spPr>
+          <p:txBody>
+            <a:bodyPr wrap="none">
+              <a:spAutoFit/>
+            </a:bodyPr>
+            <a:lstStyle/>
+            <a:p>
+              <a:r>
+                <a:rPr lang="en-GB" sz="1400" dirty="0"/>
+                <a:t>obstacle</a:t>
+              </a:r>
+              <a:endParaRPr lang="en-GB" dirty="0"/>
+            </a:p>
+          </p:txBody>
+        </p:sp>
+        <p:cxnSp>
+          <p:nvCxnSpPr>
+            <p:cNvPr id="37" name="Connettore 2 92">
+              <a:extLst>
+                <a:ext uri="{FF2B5EF4-FFF2-40B4-BE49-F238E27FC236}">
+                  <a16:creationId xmlns:a16="http://schemas.microsoft.com/office/drawing/2014/main" id="{455DABA2-950A-4F62-B4B1-A9DB9EB34ED4}"/>
+                </a:ext>
+              </a:extLst>
+            </p:cNvPr>
+            <p:cNvCxnSpPr>
+              <a:cxnSpLocks/>
+            </p:cNvCxnSpPr>
+            <p:nvPr/>
+          </p:nvCxnSpPr>
+          <p:spPr>
+            <a:xfrm flipV="1">
+              <a:off x="8503375" y="2064198"/>
+              <a:ext cx="1156402" cy="13280"/>
+            </a:xfrm>
+            <a:prstGeom prst="straightConnector1">
+              <a:avLst/>
+            </a:prstGeom>
+            <a:ln>
+              <a:prstDash val="lgDash"/>
+              <a:tailEnd type="arrow"/>
+            </a:ln>
+          </p:spPr>
+          <p:style>
+            <a:lnRef idx="1">
+              <a:schemeClr val="accent1"/>
+            </a:lnRef>
+            <a:fillRef idx="0">
+              <a:schemeClr val="accent1"/>
+            </a:fillRef>
+            <a:effectRef idx="0">
+              <a:schemeClr val="accent1"/>
+            </a:effectRef>
+            <a:fontRef idx="minor">
+              <a:schemeClr val="tx1"/>
+            </a:fontRef>
+          </p:style>
+        </p:cxnSp>
+        <p:grpSp>
+          <p:nvGrpSpPr>
+            <p:cNvPr id="39" name="Gruppo 38">
+              <a:extLst>
+                <a:ext uri="{FF2B5EF4-FFF2-40B4-BE49-F238E27FC236}">
+                  <a16:creationId xmlns:a16="http://schemas.microsoft.com/office/drawing/2014/main" id="{EDB0A3C4-E125-44BB-9C92-B21D51DC55DB}"/>
+                </a:ext>
+              </a:extLst>
+            </p:cNvPr>
+            <p:cNvGrpSpPr/>
+            <p:nvPr/>
+          </p:nvGrpSpPr>
+          <p:grpSpPr>
+            <a:xfrm>
+              <a:off x="6633293" y="1966540"/>
+              <a:ext cx="1696867" cy="1234655"/>
+              <a:chOff x="2460219" y="2004003"/>
+              <a:chExt cx="1696867" cy="1234655"/>
+            </a:xfrm>
+          </p:grpSpPr>
+          <p:sp>
+            <p:nvSpPr>
+              <p:cNvPr id="40" name="Triangolo isoscele 39">
+                <a:extLst>
+                  <a:ext uri="{FF2B5EF4-FFF2-40B4-BE49-F238E27FC236}">
+                    <a16:creationId xmlns:a16="http://schemas.microsoft.com/office/drawing/2014/main" id="{AF71783D-FF24-4C79-8A55-327095F8499B}"/>
+                  </a:ext>
+                </a:extLst>
+              </p:cNvPr>
+              <p:cNvSpPr/>
+              <p:nvPr/>
+            </p:nvSpPr>
+            <p:spPr>
+              <a:xfrm rot="5400000">
+                <a:off x="3220535" y="2242777"/>
+                <a:ext cx="998084" cy="875019"/>
+              </a:xfrm>
+              <a:prstGeom prst="triangle">
+                <a:avLst/>
+              </a:prstGeom>
+              <a:solidFill>
+                <a:srgbClr val="CCFF66"/>
+              </a:solidFill>
+              <a:ln/>
+            </p:spPr>
+            <p:style>
+              <a:lnRef idx="1">
+                <a:schemeClr val="accent5"/>
+              </a:lnRef>
+              <a:fillRef idx="2">
+                <a:schemeClr val="accent5"/>
+              </a:fillRef>
+              <a:effectRef idx="1">
+                <a:schemeClr val="accent5"/>
+              </a:effectRef>
+              <a:fontRef idx="minor">
+                <a:schemeClr val="dk1"/>
+              </a:fontRef>
+            </p:style>
+            <p:txBody>
+              <a:bodyPr rtlCol="0" anchor="ctr"/>
+              <a:lstStyle/>
+              <a:p>
+                <a:pPr algn="ctr"/>
+                <a:endParaRPr lang="en-GB" sz="1200">
+                  <a:solidFill>
+                    <a:schemeClr val="dk1"/>
+                  </a:solidFill>
+                </a:endParaRPr>
+              </a:p>
+            </p:txBody>
+          </p:sp>
+          <p:grpSp>
+            <p:nvGrpSpPr>
+              <p:cNvPr id="41" name="Gruppo 82">
+                <a:extLst>
+                  <a:ext uri="{FF2B5EF4-FFF2-40B4-BE49-F238E27FC236}">
+                    <a16:creationId xmlns:a16="http://schemas.microsoft.com/office/drawing/2014/main" id="{5FE52F0B-34AD-47AB-9285-51E82A3A9E4F}"/>
+                  </a:ext>
+                </a:extLst>
+              </p:cNvPr>
+              <p:cNvGrpSpPr/>
+              <p:nvPr/>
+            </p:nvGrpSpPr>
+            <p:grpSpPr>
+              <a:xfrm>
+                <a:off x="2460219" y="2004003"/>
+                <a:ext cx="1409184" cy="1234655"/>
+                <a:chOff x="1194666" y="2417771"/>
+                <a:chExt cx="866156" cy="763297"/>
+              </a:xfrm>
+            </p:grpSpPr>
+            <p:sp>
+              <p:nvSpPr>
+                <p:cNvPr id="43" name="Ovale 38">
+                  <a:extLst>
+                    <a:ext uri="{FF2B5EF4-FFF2-40B4-BE49-F238E27FC236}">
+                      <a16:creationId xmlns:a16="http://schemas.microsoft.com/office/drawing/2014/main" id="{342B7337-FAF7-46D2-BB2F-F94BE17F1DF8}"/>
+                    </a:ext>
+                  </a:extLst>
+                </p:cNvPr>
+                <p:cNvSpPr/>
+                <p:nvPr/>
+              </p:nvSpPr>
+              <p:spPr>
+                <a:xfrm>
+                  <a:off x="1311101" y="2460988"/>
+                  <a:ext cx="749721" cy="720080"/>
+                </a:xfrm>
+                <a:prstGeom prst="ellipse">
+                  <a:avLst/>
+                </a:prstGeom>
+                <a:solidFill>
+                  <a:srgbClr val="FFCCFF"/>
+                </a:solidFill>
+                <a:ln/>
+              </p:spPr>
+              <p:style>
+                <a:lnRef idx="1">
+                  <a:schemeClr val="accent5"/>
+                </a:lnRef>
+                <a:fillRef idx="2">
+                  <a:schemeClr val="accent5"/>
+                </a:fillRef>
+                <a:effectRef idx="1">
+                  <a:schemeClr val="accent5"/>
+                </a:effectRef>
+                <a:fontRef idx="minor">
+                  <a:schemeClr val="dk1"/>
+                </a:fontRef>
+              </p:style>
+              <p:txBody>
+                <a:bodyPr rtlCol="0" anchor="ctr"/>
+                <a:lstStyle/>
+                <a:p>
+                  <a:pPr algn="ctr"/>
+                  <a:r>
+                    <a:rPr lang="en-GB" sz="1200" dirty="0"/>
+                    <a:t> </a:t>
+                  </a:r>
+                </a:p>
+              </p:txBody>
+            </p:sp>
+            <p:sp>
+              <p:nvSpPr>
+                <p:cNvPr id="44" name="Rettangolo 39">
+                  <a:extLst>
+                    <a:ext uri="{FF2B5EF4-FFF2-40B4-BE49-F238E27FC236}">
+                      <a16:creationId xmlns:a16="http://schemas.microsoft.com/office/drawing/2014/main" id="{BCC2E644-D864-44FF-9741-9D0D1B43CBD6}"/>
+                    </a:ext>
+                  </a:extLst>
+                </p:cNvPr>
+                <p:cNvSpPr/>
+                <p:nvPr/>
+              </p:nvSpPr>
+              <p:spPr>
+                <a:xfrm>
+                  <a:off x="1194666" y="2699711"/>
+                  <a:ext cx="281433" cy="211952"/>
+                </a:xfrm>
+                <a:prstGeom prst="rect">
+                  <a:avLst/>
+                </a:prstGeom>
+                <a:solidFill>
+                  <a:srgbClr val="FFCCFF"/>
+                </a:solidFill>
+                <a:ln/>
+              </p:spPr>
+              <p:style>
+                <a:lnRef idx="1">
+                  <a:schemeClr val="accent5"/>
+                </a:lnRef>
+                <a:fillRef idx="2">
+                  <a:schemeClr val="accent5"/>
+                </a:fillRef>
+                <a:effectRef idx="1">
+                  <a:schemeClr val="accent5"/>
+                </a:effectRef>
+                <a:fontRef idx="minor">
+                  <a:schemeClr val="dk1"/>
+                </a:fontRef>
+              </p:style>
+              <p:txBody>
+                <a:bodyPr rtlCol="0" anchor="ctr"/>
+                <a:lstStyle/>
+                <a:p>
+                  <a:pPr algn="ctr"/>
+                  <a:endParaRPr lang="en-GB" sz="1200"/>
+                </a:p>
+              </p:txBody>
+            </p:sp>
+            <p:sp>
+              <p:nvSpPr>
+                <p:cNvPr id="45" name="Triangolo isoscele 42">
+                  <a:extLst>
+                    <a:ext uri="{FF2B5EF4-FFF2-40B4-BE49-F238E27FC236}">
+                      <a16:creationId xmlns:a16="http://schemas.microsoft.com/office/drawing/2014/main" id="{545D3B1A-15B2-4CA0-B4A1-352AF8652519}"/>
+                    </a:ext>
+                  </a:extLst>
+                </p:cNvPr>
+                <p:cNvSpPr/>
+                <p:nvPr/>
+              </p:nvSpPr>
+              <p:spPr>
+                <a:xfrm rot="16200000">
+                  <a:off x="1618539" y="2391356"/>
+                  <a:ext cx="86434" cy="139263"/>
+                </a:xfrm>
+                <a:prstGeom prst="triangle">
+                  <a:avLst/>
+                </a:prstGeom>
+                <a:solidFill>
+                  <a:srgbClr val="FF0000"/>
+                </a:solidFill>
+                <a:ln/>
+              </p:spPr>
+              <p:style>
+                <a:lnRef idx="1">
+                  <a:schemeClr val="accent5"/>
+                </a:lnRef>
+                <a:fillRef idx="2">
+                  <a:schemeClr val="accent5"/>
+                </a:fillRef>
+                <a:effectRef idx="1">
+                  <a:schemeClr val="accent5"/>
+                </a:effectRef>
+                <a:fontRef idx="minor">
+                  <a:schemeClr val="dk1"/>
+                </a:fontRef>
+              </p:style>
+              <p:txBody>
+                <a:bodyPr rtlCol="0" anchor="ctr"/>
+                <a:lstStyle/>
+                <a:p>
+                  <a:pPr algn="ctr"/>
+                  <a:endParaRPr lang="en-GB" sz="1200">
+                    <a:solidFill>
+                      <a:schemeClr val="dk1"/>
+                    </a:solidFill>
+                  </a:endParaRPr>
+                </a:p>
+              </p:txBody>
+            </p:sp>
+          </p:grpSp>
+          <p:sp>
+            <p:nvSpPr>
+              <p:cNvPr id="42" name="Rettangolo 41">
+                <a:extLst>
+                  <a:ext uri="{FF2B5EF4-FFF2-40B4-BE49-F238E27FC236}">
+                    <a16:creationId xmlns:a16="http://schemas.microsoft.com/office/drawing/2014/main" id="{81A9AA82-2059-4945-9252-915C335CA6E6}"/>
+                  </a:ext>
+                </a:extLst>
+              </p:cNvPr>
+              <p:cNvSpPr/>
+              <p:nvPr/>
+            </p:nvSpPr>
+            <p:spPr>
+              <a:xfrm>
+                <a:off x="2635583" y="2458538"/>
+                <a:ext cx="1400320" cy="369332"/>
+              </a:xfrm>
+              <a:prstGeom prst="rect">
+                <a:avLst/>
+              </a:prstGeom>
+            </p:spPr>
+            <p:txBody>
+              <a:bodyPr wrap="none">
+                <a:spAutoFit/>
+              </a:bodyPr>
+              <a:lstStyle/>
+              <a:p>
+                <a:r>
+                  <a:rPr lang="en-GB" dirty="0" err="1"/>
+                  <a:t>waiterwalker</a:t>
+                </a:r>
+                <a:endParaRPr lang="en-GB" dirty="0"/>
+              </a:p>
+            </p:txBody>
+          </p:sp>
+        </p:grpSp>
+        <p:grpSp>
+          <p:nvGrpSpPr>
+            <p:cNvPr id="48" name="Gruppo 56">
+              <a:extLst>
+                <a:ext uri="{FF2B5EF4-FFF2-40B4-BE49-F238E27FC236}">
+                  <a16:creationId xmlns:a16="http://schemas.microsoft.com/office/drawing/2014/main" id="{DB13407C-3FB6-4190-8E03-D1335F07E2DD}"/>
+                </a:ext>
+              </a:extLst>
+            </p:cNvPr>
+            <p:cNvGrpSpPr/>
+            <p:nvPr/>
+          </p:nvGrpSpPr>
+          <p:grpSpPr>
+            <a:xfrm>
+              <a:off x="8503375" y="2398140"/>
+              <a:ext cx="1246006" cy="186933"/>
+              <a:chOff x="4586473" y="4245346"/>
+              <a:chExt cx="667405" cy="86434"/>
+            </a:xfrm>
+          </p:grpSpPr>
+          <p:sp>
+            <p:nvSpPr>
+              <p:cNvPr id="49" name="Freccia a destra 58">
+                <a:extLst>
+                  <a:ext uri="{FF2B5EF4-FFF2-40B4-BE49-F238E27FC236}">
+                    <a16:creationId xmlns:a16="http://schemas.microsoft.com/office/drawing/2014/main" id="{39DD38D6-1415-422A-9148-0D5B4A8973FD}"/>
+                  </a:ext>
+                </a:extLst>
+              </p:cNvPr>
+              <p:cNvSpPr/>
+              <p:nvPr/>
+            </p:nvSpPr>
+            <p:spPr>
+              <a:xfrm>
+                <a:off x="4586473" y="4251518"/>
+                <a:ext cx="577147" cy="80262"/>
+              </a:xfrm>
+              <a:prstGeom prst="rightArrow">
+                <a:avLst/>
+              </a:prstGeom>
+            </p:spPr>
+            <p:style>
+              <a:lnRef idx="1">
+                <a:schemeClr val="accent1"/>
+              </a:lnRef>
+              <a:fillRef idx="2">
+                <a:schemeClr val="accent1"/>
+              </a:fillRef>
+              <a:effectRef idx="1">
+                <a:schemeClr val="accent1"/>
+              </a:effectRef>
+              <a:fontRef idx="minor">
+                <a:schemeClr val="dk1"/>
+              </a:fontRef>
+            </p:style>
+            <p:txBody>
+              <a:bodyPr rtlCol="0" anchor="ctr"/>
+              <a:lstStyle/>
+              <a:p>
+                <a:pPr algn="ctr"/>
+                <a:endParaRPr lang="en-GB"/>
+              </a:p>
+            </p:txBody>
+          </p:sp>
+          <p:sp>
+            <p:nvSpPr>
+              <p:cNvPr id="50" name="Triangolo isoscele 76">
+                <a:extLst>
+                  <a:ext uri="{FF2B5EF4-FFF2-40B4-BE49-F238E27FC236}">
+                    <a16:creationId xmlns:a16="http://schemas.microsoft.com/office/drawing/2014/main" id="{74B3EFB6-B795-4852-AA41-0A7CD08515C4}"/>
+                  </a:ext>
+                </a:extLst>
+              </p:cNvPr>
+              <p:cNvSpPr/>
+              <p:nvPr/>
+            </p:nvSpPr>
+            <p:spPr>
+              <a:xfrm rot="5400000" flipH="1">
+                <a:off x="5141030" y="4218931"/>
+                <a:ext cx="86434" cy="139263"/>
+              </a:xfrm>
+              <a:prstGeom prst="triangle">
+                <a:avLst/>
+              </a:prstGeom>
+              <a:solidFill>
+                <a:schemeClr val="bg1"/>
+              </a:solidFill>
+              <a:ln/>
+            </p:spPr>
+            <p:style>
+              <a:lnRef idx="1">
+                <a:schemeClr val="accent5"/>
+              </a:lnRef>
+              <a:fillRef idx="2">
+                <a:schemeClr val="accent5"/>
+              </a:fillRef>
+              <a:effectRef idx="1">
+                <a:schemeClr val="accent5"/>
+              </a:effectRef>
+              <a:fontRef idx="minor">
+                <a:schemeClr val="dk1"/>
+              </a:fontRef>
+            </p:style>
+            <p:txBody>
+              <a:bodyPr rtlCol="0" anchor="ctr"/>
+              <a:lstStyle/>
+              <a:p>
+                <a:pPr algn="ctr"/>
+                <a:endParaRPr lang="en-GB" sz="1200">
+                  <a:solidFill>
+                    <a:schemeClr val="dk1"/>
+                  </a:solidFill>
+                </a:endParaRPr>
+              </a:p>
+            </p:txBody>
+          </p:sp>
+        </p:grpSp>
+        <p:grpSp>
+          <p:nvGrpSpPr>
+            <p:cNvPr id="51" name="Gruppo 87">
+              <a:extLst>
+                <a:ext uri="{FF2B5EF4-FFF2-40B4-BE49-F238E27FC236}">
+                  <a16:creationId xmlns:a16="http://schemas.microsoft.com/office/drawing/2014/main" id="{A0B9DA95-CDCA-4B37-BDBE-3076C77C93DF}"/>
+                </a:ext>
+              </a:extLst>
+            </p:cNvPr>
+            <p:cNvGrpSpPr/>
+            <p:nvPr/>
+          </p:nvGrpSpPr>
+          <p:grpSpPr>
+            <a:xfrm>
+              <a:off x="8473428" y="2710264"/>
+              <a:ext cx="1275955" cy="195464"/>
+              <a:chOff x="4592177" y="4419530"/>
+              <a:chExt cx="666895" cy="86434"/>
+            </a:xfrm>
+          </p:grpSpPr>
+          <p:cxnSp>
+            <p:nvCxnSpPr>
+              <p:cNvPr id="52" name="Connettore 1 89">
+                <a:extLst>
+                  <a:ext uri="{FF2B5EF4-FFF2-40B4-BE49-F238E27FC236}">
+                    <a16:creationId xmlns:a16="http://schemas.microsoft.com/office/drawing/2014/main" id="{BD5F6243-E497-4744-9AB3-C0341D740EC9}"/>
+                  </a:ext>
+                </a:extLst>
+              </p:cNvPr>
+              <p:cNvCxnSpPr/>
+              <p:nvPr/>
+            </p:nvCxnSpPr>
+            <p:spPr>
+              <a:xfrm>
+                <a:off x="4611000" y="4462747"/>
+                <a:ext cx="648072" cy="0"/>
+              </a:xfrm>
+              <a:prstGeom prst="line">
+                <a:avLst/>
+              </a:prstGeom>
+              <a:ln>
+                <a:prstDash val="dash"/>
+              </a:ln>
+            </p:spPr>
+            <p:style>
+              <a:lnRef idx="1">
+                <a:schemeClr val="accent1"/>
+              </a:lnRef>
+              <a:fillRef idx="0">
+                <a:schemeClr val="accent1"/>
+              </a:fillRef>
+              <a:effectRef idx="0">
+                <a:schemeClr val="accent1"/>
+              </a:effectRef>
+              <a:fontRef idx="minor">
+                <a:schemeClr val="tx1"/>
+              </a:fontRef>
+            </p:style>
+          </p:cxnSp>
+          <p:sp>
+            <p:nvSpPr>
+              <p:cNvPr id="53" name="Triangolo isoscele 90">
+                <a:extLst>
+                  <a:ext uri="{FF2B5EF4-FFF2-40B4-BE49-F238E27FC236}">
+                    <a16:creationId xmlns:a16="http://schemas.microsoft.com/office/drawing/2014/main" id="{ED7EFD8B-9E2F-40AD-9C0B-904ACE2A0C1D}"/>
+                  </a:ext>
+                </a:extLst>
+              </p:cNvPr>
+              <p:cNvSpPr/>
+              <p:nvPr/>
+            </p:nvSpPr>
+            <p:spPr>
+              <a:xfrm rot="16200000">
+                <a:off x="4618592" y="4393115"/>
+                <a:ext cx="86434" cy="139263"/>
+              </a:xfrm>
+              <a:prstGeom prst="triangle">
+                <a:avLst/>
+              </a:prstGeom>
+              <a:solidFill>
+                <a:schemeClr val="bg1"/>
+              </a:solidFill>
+              <a:ln/>
+            </p:spPr>
+            <p:style>
+              <a:lnRef idx="1">
+                <a:schemeClr val="accent5"/>
+              </a:lnRef>
+              <a:fillRef idx="2">
+                <a:schemeClr val="accent5"/>
+              </a:fillRef>
+              <a:effectRef idx="1">
+                <a:schemeClr val="accent5"/>
+              </a:effectRef>
+              <a:fontRef idx="minor">
+                <a:schemeClr val="dk1"/>
+              </a:fontRef>
+            </p:style>
+            <p:txBody>
+              <a:bodyPr rtlCol="0" anchor="ctr"/>
+              <a:lstStyle/>
+              <a:p>
+                <a:pPr algn="ctr"/>
+                <a:endParaRPr lang="en-GB" sz="1200"/>
+              </a:p>
+            </p:txBody>
+          </p:sp>
+        </p:grpSp>
+        <p:sp>
+          <p:nvSpPr>
+            <p:cNvPr id="54" name="CasellaDiTesto 67">
+              <a:extLst>
+                <a:ext uri="{FF2B5EF4-FFF2-40B4-BE49-F238E27FC236}">
+                  <a16:creationId xmlns:a16="http://schemas.microsoft.com/office/drawing/2014/main" id="{AE8A07C8-C7E2-4B34-A9E2-16D3276E25EF}"/>
+                </a:ext>
+              </a:extLst>
+            </p:cNvPr>
+            <p:cNvSpPr txBox="1"/>
+            <p:nvPr/>
+          </p:nvSpPr>
+          <p:spPr>
+            <a:xfrm>
+              <a:off x="8674892" y="2941811"/>
+              <a:ext cx="1015316" cy="606994"/>
+            </a:xfrm>
+            <a:prstGeom prst="rect">
+              <a:avLst/>
+            </a:prstGeom>
+            <a:noFill/>
+          </p:spPr>
+          <p:txBody>
+            <a:bodyPr wrap="none" rtlCol="0">
+              <a:spAutoFit/>
+            </a:bodyPr>
+            <a:lstStyle/>
+            <a:p>
+              <a:r>
+                <a:rPr lang="it-IT" sz="1400" dirty="0" err="1"/>
+                <a:t>stepDone</a:t>
+              </a:r>
+              <a:endParaRPr lang="it-IT" sz="1400" dirty="0"/>
+            </a:p>
+            <a:p>
+              <a:r>
+                <a:rPr lang="it-IT" sz="1400" dirty="0" err="1"/>
+                <a:t>stepFail</a:t>
+              </a:r>
+              <a:endParaRPr lang="en-GB" sz="1400" dirty="0"/>
+            </a:p>
+          </p:txBody>
+        </p:sp>
+        <p:sp>
+          <p:nvSpPr>
+            <p:cNvPr id="55" name="CasellaDiTesto 67">
+              <a:extLst>
+                <a:ext uri="{FF2B5EF4-FFF2-40B4-BE49-F238E27FC236}">
+                  <a16:creationId xmlns:a16="http://schemas.microsoft.com/office/drawing/2014/main" id="{0604F9C8-E38D-464E-A7A8-B32772DFE484}"/>
+                </a:ext>
+              </a:extLst>
+            </p:cNvPr>
+            <p:cNvSpPr txBox="1"/>
+            <p:nvPr/>
+          </p:nvSpPr>
+          <p:spPr>
+            <a:xfrm>
+              <a:off x="8896404" y="1658036"/>
+              <a:ext cx="569779" cy="357056"/>
+            </a:xfrm>
+            <a:prstGeom prst="rect">
+              <a:avLst/>
+            </a:prstGeom>
+            <a:noFill/>
+          </p:spPr>
+          <p:txBody>
+            <a:bodyPr wrap="none" rtlCol="0">
+              <a:spAutoFit/>
+            </a:bodyPr>
+            <a:lstStyle/>
+            <a:p>
+              <a:r>
+                <a:rPr lang="it-IT" sz="1400" dirty="0" err="1"/>
+                <a:t>cmd</a:t>
+              </a:r>
+              <a:endParaRPr lang="en-GB" sz="2000" dirty="0"/>
+            </a:p>
+          </p:txBody>
+        </p:sp>
+        <p:sp>
+          <p:nvSpPr>
+            <p:cNvPr id="57" name="CasellaDiTesto 67">
+              <a:extLst>
+                <a:ext uri="{FF2B5EF4-FFF2-40B4-BE49-F238E27FC236}">
+                  <a16:creationId xmlns:a16="http://schemas.microsoft.com/office/drawing/2014/main" id="{57E3D22E-7DA6-4A47-88E4-FECBFB74F0AA}"/>
+                </a:ext>
+              </a:extLst>
+            </p:cNvPr>
+            <p:cNvSpPr txBox="1"/>
+            <p:nvPr/>
+          </p:nvSpPr>
+          <p:spPr>
+            <a:xfrm>
+              <a:off x="5071949" y="1854276"/>
+              <a:ext cx="1529918" cy="357056"/>
+            </a:xfrm>
+            <a:prstGeom prst="rect">
+              <a:avLst/>
+            </a:prstGeom>
+            <a:noFill/>
+          </p:spPr>
+          <p:txBody>
+            <a:bodyPr wrap="none" rtlCol="0">
+              <a:spAutoFit/>
+            </a:bodyPr>
+            <a:lstStyle/>
+            <a:p>
+              <a:r>
+                <a:rPr lang="it-IT" sz="1400" dirty="0" err="1"/>
+                <a:t>movetoCell</a:t>
+              </a:r>
+              <a:r>
+                <a:rPr lang="it-IT" sz="1400" dirty="0"/>
+                <a:t>(X,Y)</a:t>
+              </a:r>
+              <a:endParaRPr lang="en-GB" dirty="0"/>
+            </a:p>
+          </p:txBody>
+        </p:sp>
+        <p:grpSp>
+          <p:nvGrpSpPr>
+            <p:cNvPr id="58" name="Gruppo 56">
+              <a:extLst>
+                <a:ext uri="{FF2B5EF4-FFF2-40B4-BE49-F238E27FC236}">
+                  <a16:creationId xmlns:a16="http://schemas.microsoft.com/office/drawing/2014/main" id="{2115073D-F661-4B4B-A5E1-281694498F31}"/>
+                </a:ext>
+              </a:extLst>
+            </p:cNvPr>
+            <p:cNvGrpSpPr/>
+            <p:nvPr/>
+          </p:nvGrpSpPr>
+          <p:grpSpPr>
+            <a:xfrm>
+              <a:off x="5156967" y="2259328"/>
+              <a:ext cx="1246006" cy="186933"/>
+              <a:chOff x="4586473" y="4245346"/>
+              <a:chExt cx="667405" cy="86434"/>
+            </a:xfrm>
+          </p:grpSpPr>
+          <p:sp>
+            <p:nvSpPr>
+              <p:cNvPr id="59" name="Freccia a destra 58">
+                <a:extLst>
+                  <a:ext uri="{FF2B5EF4-FFF2-40B4-BE49-F238E27FC236}">
+                    <a16:creationId xmlns:a16="http://schemas.microsoft.com/office/drawing/2014/main" id="{8F66DA4B-B00A-46C9-B043-7AA6B4ED9C93}"/>
+                  </a:ext>
+                </a:extLst>
+              </p:cNvPr>
+              <p:cNvSpPr/>
+              <p:nvPr/>
+            </p:nvSpPr>
+            <p:spPr>
+              <a:xfrm>
+                <a:off x="4586473" y="4251518"/>
+                <a:ext cx="577147" cy="80262"/>
+              </a:xfrm>
+              <a:prstGeom prst="rightArrow">
+                <a:avLst/>
+              </a:prstGeom>
+            </p:spPr>
+            <p:style>
+              <a:lnRef idx="1">
+                <a:schemeClr val="accent1"/>
+              </a:lnRef>
+              <a:fillRef idx="2">
+                <a:schemeClr val="accent1"/>
+              </a:fillRef>
+              <a:effectRef idx="1">
+                <a:schemeClr val="accent1"/>
+              </a:effectRef>
+              <a:fontRef idx="minor">
+                <a:schemeClr val="dk1"/>
+              </a:fontRef>
+            </p:style>
+            <p:txBody>
+              <a:bodyPr rtlCol="0" anchor="ctr"/>
+              <a:lstStyle/>
+              <a:p>
+                <a:pPr algn="ctr"/>
+                <a:endParaRPr lang="en-GB"/>
+              </a:p>
+            </p:txBody>
+          </p:sp>
+          <p:sp>
+            <p:nvSpPr>
+              <p:cNvPr id="60" name="Triangolo isoscele 76">
+                <a:extLst>
+                  <a:ext uri="{FF2B5EF4-FFF2-40B4-BE49-F238E27FC236}">
+                    <a16:creationId xmlns:a16="http://schemas.microsoft.com/office/drawing/2014/main" id="{F5B2140E-C135-43E9-BAB5-149DBF62FB02}"/>
+                  </a:ext>
+                </a:extLst>
+              </p:cNvPr>
+              <p:cNvSpPr/>
+              <p:nvPr/>
+            </p:nvSpPr>
+            <p:spPr>
+              <a:xfrm rot="5400000" flipH="1">
+                <a:off x="5141030" y="4218931"/>
+                <a:ext cx="86434" cy="139263"/>
+              </a:xfrm>
+              <a:prstGeom prst="triangle">
+                <a:avLst/>
+              </a:prstGeom>
+              <a:solidFill>
+                <a:schemeClr val="bg1"/>
+              </a:solidFill>
+              <a:ln/>
+            </p:spPr>
+            <p:style>
+              <a:lnRef idx="1">
+                <a:schemeClr val="accent5"/>
+              </a:lnRef>
+              <a:fillRef idx="2">
+                <a:schemeClr val="accent5"/>
+              </a:fillRef>
+              <a:effectRef idx="1">
+                <a:schemeClr val="accent5"/>
+              </a:effectRef>
+              <a:fontRef idx="minor">
+                <a:schemeClr val="dk1"/>
+              </a:fontRef>
+            </p:style>
+            <p:txBody>
+              <a:bodyPr rtlCol="0" anchor="ctr"/>
+              <a:lstStyle/>
+              <a:p>
+                <a:pPr algn="ctr"/>
+                <a:endParaRPr lang="en-GB" sz="1200">
+                  <a:solidFill>
+                    <a:schemeClr val="dk1"/>
+                  </a:solidFill>
+                </a:endParaRPr>
+              </a:p>
+            </p:txBody>
+          </p:sp>
+        </p:grpSp>
+        <p:grpSp>
+          <p:nvGrpSpPr>
+            <p:cNvPr id="61" name="Gruppo 87">
+              <a:extLst>
+                <a:ext uri="{FF2B5EF4-FFF2-40B4-BE49-F238E27FC236}">
+                  <a16:creationId xmlns:a16="http://schemas.microsoft.com/office/drawing/2014/main" id="{ECB84A5C-CC08-474A-81E1-F67CBBEDF7A9}"/>
+                </a:ext>
+              </a:extLst>
+            </p:cNvPr>
+            <p:cNvGrpSpPr/>
+            <p:nvPr/>
+          </p:nvGrpSpPr>
+          <p:grpSpPr>
+            <a:xfrm>
+              <a:off x="5083632" y="2702863"/>
+              <a:ext cx="1275955" cy="195464"/>
+              <a:chOff x="4592177" y="4419530"/>
+              <a:chExt cx="666895" cy="86434"/>
+            </a:xfrm>
+          </p:grpSpPr>
+          <p:cxnSp>
+            <p:nvCxnSpPr>
+              <p:cNvPr id="62" name="Connettore 1 89">
+                <a:extLst>
+                  <a:ext uri="{FF2B5EF4-FFF2-40B4-BE49-F238E27FC236}">
+                    <a16:creationId xmlns:a16="http://schemas.microsoft.com/office/drawing/2014/main" id="{F48CAAD3-75C5-4BB7-B257-96CFB43EF792}"/>
+                  </a:ext>
+                </a:extLst>
+              </p:cNvPr>
+              <p:cNvCxnSpPr/>
+              <p:nvPr/>
+            </p:nvCxnSpPr>
+            <p:spPr>
+              <a:xfrm>
+                <a:off x="4611000" y="4462747"/>
+                <a:ext cx="648072" cy="0"/>
+              </a:xfrm>
+              <a:prstGeom prst="line">
+                <a:avLst/>
+              </a:prstGeom>
+              <a:ln>
+                <a:prstDash val="dash"/>
+              </a:ln>
+            </p:spPr>
+            <p:style>
+              <a:lnRef idx="1">
+                <a:schemeClr val="accent1"/>
+              </a:lnRef>
+              <a:fillRef idx="0">
+                <a:schemeClr val="accent1"/>
+              </a:fillRef>
+              <a:effectRef idx="0">
+                <a:schemeClr val="accent1"/>
+              </a:effectRef>
+              <a:fontRef idx="minor">
+                <a:schemeClr val="tx1"/>
+              </a:fontRef>
+            </p:style>
+          </p:cxnSp>
+          <p:sp>
+            <p:nvSpPr>
+              <p:cNvPr id="63" name="Triangolo isoscele 90">
+                <a:extLst>
+                  <a:ext uri="{FF2B5EF4-FFF2-40B4-BE49-F238E27FC236}">
+                    <a16:creationId xmlns:a16="http://schemas.microsoft.com/office/drawing/2014/main" id="{AF488512-D72F-4838-B42F-BA5F8A22CAC8}"/>
+                  </a:ext>
+                </a:extLst>
+              </p:cNvPr>
+              <p:cNvSpPr/>
+              <p:nvPr/>
+            </p:nvSpPr>
+            <p:spPr>
+              <a:xfrm rot="16200000">
+                <a:off x="4618592" y="4393115"/>
+                <a:ext cx="86434" cy="139263"/>
+              </a:xfrm>
+              <a:prstGeom prst="triangle">
+                <a:avLst/>
+              </a:prstGeom>
+              <a:solidFill>
+                <a:schemeClr val="bg1"/>
+              </a:solidFill>
+              <a:ln/>
+            </p:spPr>
+            <p:style>
+              <a:lnRef idx="1">
+                <a:schemeClr val="accent5"/>
+              </a:lnRef>
+              <a:fillRef idx="2">
+                <a:schemeClr val="accent5"/>
+              </a:fillRef>
+              <a:effectRef idx="1">
+                <a:schemeClr val="accent5"/>
+              </a:effectRef>
+              <a:fontRef idx="minor">
+                <a:schemeClr val="dk1"/>
+              </a:fontRef>
+            </p:style>
+            <p:txBody>
+              <a:bodyPr rtlCol="0" anchor="ctr"/>
+              <a:lstStyle/>
+              <a:p>
+                <a:pPr algn="ctr"/>
+                <a:endParaRPr lang="en-GB" sz="1200"/>
+              </a:p>
+            </p:txBody>
+          </p:sp>
+        </p:grpSp>
+        <p:sp>
+          <p:nvSpPr>
+            <p:cNvPr id="64" name="CasellaDiTesto 67">
+              <a:extLst>
+                <a:ext uri="{FF2B5EF4-FFF2-40B4-BE49-F238E27FC236}">
+                  <a16:creationId xmlns:a16="http://schemas.microsoft.com/office/drawing/2014/main" id="{F1BDD3D1-E510-4488-A2B4-553ED3257DFA}"/>
+                </a:ext>
+              </a:extLst>
+            </p:cNvPr>
+            <p:cNvSpPr txBox="1"/>
+            <p:nvPr/>
+          </p:nvSpPr>
+          <p:spPr>
+            <a:xfrm>
+              <a:off x="5285096" y="2890020"/>
+              <a:ext cx="1073579" cy="606994"/>
+            </a:xfrm>
+            <a:prstGeom prst="rect">
+              <a:avLst/>
+            </a:prstGeom>
+            <a:noFill/>
+          </p:spPr>
+          <p:txBody>
+            <a:bodyPr wrap="none" rtlCol="0">
+              <a:spAutoFit/>
+            </a:bodyPr>
+            <a:lstStyle/>
+            <a:p>
+              <a:r>
+                <a:rPr lang="it-IT" sz="1400" dirty="0" err="1"/>
+                <a:t>atCell</a:t>
+              </a:r>
+              <a:r>
+                <a:rPr lang="it-IT" sz="1400" dirty="0"/>
+                <a:t>(X,Y)</a:t>
+              </a:r>
+            </a:p>
+            <a:p>
+              <a:r>
+                <a:rPr lang="it-IT" sz="1400" dirty="0" err="1"/>
+                <a:t>walkBreak</a:t>
+              </a:r>
+              <a:endParaRPr lang="en-GB" sz="1400" dirty="0"/>
+            </a:p>
+          </p:txBody>
+        </p:sp>
+        <p:grpSp>
+          <p:nvGrpSpPr>
+            <p:cNvPr id="56" name="Gruppo 55">
+              <a:extLst>
+                <a:ext uri="{FF2B5EF4-FFF2-40B4-BE49-F238E27FC236}">
+                  <a16:creationId xmlns:a16="http://schemas.microsoft.com/office/drawing/2014/main" id="{08FCCC36-C1E2-4F07-BEDD-FE6E528D49C1}"/>
+                </a:ext>
+              </a:extLst>
+            </p:cNvPr>
+            <p:cNvGrpSpPr/>
+            <p:nvPr/>
+          </p:nvGrpSpPr>
+          <p:grpSpPr>
+            <a:xfrm>
+              <a:off x="3148039" y="1979821"/>
+              <a:ext cx="1696867" cy="1234655"/>
+              <a:chOff x="2460219" y="2004003"/>
+              <a:chExt cx="1696867" cy="1234655"/>
+            </a:xfrm>
+          </p:grpSpPr>
+          <p:sp>
+            <p:nvSpPr>
+              <p:cNvPr id="66" name="Triangolo isoscele 65">
+                <a:extLst>
+                  <a:ext uri="{FF2B5EF4-FFF2-40B4-BE49-F238E27FC236}">
+                    <a16:creationId xmlns:a16="http://schemas.microsoft.com/office/drawing/2014/main" id="{18C585BC-9D72-49D9-AA05-A2A6502FB1F2}"/>
+                  </a:ext>
+                </a:extLst>
+              </p:cNvPr>
+              <p:cNvSpPr/>
+              <p:nvPr/>
+            </p:nvSpPr>
+            <p:spPr>
+              <a:xfrm rot="5400000">
+                <a:off x="3220535" y="2242777"/>
+                <a:ext cx="998084" cy="875019"/>
+              </a:xfrm>
+              <a:prstGeom prst="triangle">
+                <a:avLst/>
+              </a:prstGeom>
+              <a:solidFill>
+                <a:srgbClr val="CCFF66"/>
+              </a:solidFill>
+              <a:ln/>
+            </p:spPr>
+            <p:style>
+              <a:lnRef idx="1">
+                <a:schemeClr val="accent5"/>
+              </a:lnRef>
+              <a:fillRef idx="2">
+                <a:schemeClr val="accent5"/>
+              </a:fillRef>
+              <a:effectRef idx="1">
+                <a:schemeClr val="accent5"/>
+              </a:effectRef>
+              <a:fontRef idx="minor">
+                <a:schemeClr val="dk1"/>
+              </a:fontRef>
+            </p:style>
+            <p:txBody>
+              <a:bodyPr rtlCol="0" anchor="ctr"/>
+              <a:lstStyle/>
+              <a:p>
+                <a:pPr algn="ctr"/>
+                <a:endParaRPr lang="en-GB" sz="1200">
+                  <a:solidFill>
+                    <a:schemeClr val="dk1"/>
+                  </a:solidFill>
+                </a:endParaRPr>
+              </a:p>
+            </p:txBody>
+          </p:sp>
+          <p:grpSp>
+            <p:nvGrpSpPr>
+              <p:cNvPr id="67" name="Gruppo 82">
+                <a:extLst>
+                  <a:ext uri="{FF2B5EF4-FFF2-40B4-BE49-F238E27FC236}">
+                    <a16:creationId xmlns:a16="http://schemas.microsoft.com/office/drawing/2014/main" id="{E0003C95-2426-41AF-AD9D-1569BD95E365}"/>
+                  </a:ext>
+                </a:extLst>
+              </p:cNvPr>
+              <p:cNvGrpSpPr/>
+              <p:nvPr/>
+            </p:nvGrpSpPr>
+            <p:grpSpPr>
+              <a:xfrm>
+                <a:off x="2460219" y="2004003"/>
+                <a:ext cx="1409184" cy="1234655"/>
+                <a:chOff x="1194666" y="2417771"/>
+                <a:chExt cx="866156" cy="763297"/>
+              </a:xfrm>
+            </p:grpSpPr>
+            <p:sp>
+              <p:nvSpPr>
+                <p:cNvPr id="70" name="Ovale 38">
+                  <a:extLst>
+                    <a:ext uri="{FF2B5EF4-FFF2-40B4-BE49-F238E27FC236}">
+                      <a16:creationId xmlns:a16="http://schemas.microsoft.com/office/drawing/2014/main" id="{6F4EFC25-28DC-40B8-BBAA-D7E7AD6C27F8}"/>
+                    </a:ext>
+                  </a:extLst>
+                </p:cNvPr>
+                <p:cNvSpPr/>
+                <p:nvPr/>
+              </p:nvSpPr>
+              <p:spPr>
+                <a:xfrm>
+                  <a:off x="1311101" y="2460988"/>
+                  <a:ext cx="749721" cy="720080"/>
+                </a:xfrm>
+                <a:prstGeom prst="ellipse">
+                  <a:avLst/>
+                </a:prstGeom>
+                <a:solidFill>
+                  <a:srgbClr val="FFCCFF"/>
+                </a:solidFill>
+                <a:ln/>
+              </p:spPr>
+              <p:style>
+                <a:lnRef idx="1">
+                  <a:schemeClr val="accent5"/>
+                </a:lnRef>
+                <a:fillRef idx="2">
+                  <a:schemeClr val="accent5"/>
+                </a:fillRef>
+                <a:effectRef idx="1">
+                  <a:schemeClr val="accent5"/>
+                </a:effectRef>
+                <a:fontRef idx="minor">
+                  <a:schemeClr val="dk1"/>
+                </a:fontRef>
+              </p:style>
+              <p:txBody>
+                <a:bodyPr rtlCol="0" anchor="ctr"/>
+                <a:lstStyle/>
+                <a:p>
+                  <a:pPr algn="ctr"/>
+                  <a:r>
+                    <a:rPr lang="en-GB" sz="1200" dirty="0"/>
+                    <a:t> </a:t>
+                  </a:r>
+                </a:p>
+              </p:txBody>
+            </p:sp>
+            <p:sp>
+              <p:nvSpPr>
+                <p:cNvPr id="71" name="Rettangolo 39">
+                  <a:extLst>
+                    <a:ext uri="{FF2B5EF4-FFF2-40B4-BE49-F238E27FC236}">
+                      <a16:creationId xmlns:a16="http://schemas.microsoft.com/office/drawing/2014/main" id="{6F01CC38-704F-43F9-9844-EFC274130250}"/>
+                    </a:ext>
+                  </a:extLst>
+                </p:cNvPr>
+                <p:cNvSpPr/>
+                <p:nvPr/>
+              </p:nvSpPr>
+              <p:spPr>
+                <a:xfrm>
+                  <a:off x="1194666" y="2699711"/>
+                  <a:ext cx="281433" cy="211952"/>
+                </a:xfrm>
+                <a:prstGeom prst="rect">
+                  <a:avLst/>
+                </a:prstGeom>
+                <a:solidFill>
+                  <a:srgbClr val="FFCCFF"/>
+                </a:solidFill>
+                <a:ln/>
+              </p:spPr>
+              <p:style>
+                <a:lnRef idx="1">
+                  <a:schemeClr val="accent5"/>
+                </a:lnRef>
+                <a:fillRef idx="2">
+                  <a:schemeClr val="accent5"/>
+                </a:fillRef>
+                <a:effectRef idx="1">
+                  <a:schemeClr val="accent5"/>
+                </a:effectRef>
+                <a:fontRef idx="minor">
+                  <a:schemeClr val="dk1"/>
+                </a:fontRef>
+              </p:style>
+              <p:txBody>
+                <a:bodyPr rtlCol="0" anchor="ctr"/>
+                <a:lstStyle/>
+                <a:p>
+                  <a:pPr algn="ctr"/>
+                  <a:endParaRPr lang="en-GB" sz="1200"/>
+                </a:p>
+              </p:txBody>
+            </p:sp>
+            <p:sp>
+              <p:nvSpPr>
+                <p:cNvPr id="72" name="Triangolo isoscele 42">
+                  <a:extLst>
+                    <a:ext uri="{FF2B5EF4-FFF2-40B4-BE49-F238E27FC236}">
+                      <a16:creationId xmlns:a16="http://schemas.microsoft.com/office/drawing/2014/main" id="{74691BF3-B443-4845-B82C-989B098C7A0F}"/>
+                    </a:ext>
+                  </a:extLst>
+                </p:cNvPr>
+                <p:cNvSpPr/>
+                <p:nvPr/>
+              </p:nvSpPr>
+              <p:spPr>
+                <a:xfrm rot="16200000">
+                  <a:off x="1618539" y="2391356"/>
+                  <a:ext cx="86434" cy="139263"/>
+                </a:xfrm>
+                <a:prstGeom prst="triangle">
+                  <a:avLst/>
+                </a:prstGeom>
+                <a:solidFill>
+                  <a:srgbClr val="FF0000"/>
+                </a:solidFill>
+                <a:ln/>
+              </p:spPr>
+              <p:style>
+                <a:lnRef idx="1">
+                  <a:schemeClr val="accent5"/>
+                </a:lnRef>
+                <a:fillRef idx="2">
+                  <a:schemeClr val="accent5"/>
+                </a:fillRef>
+                <a:effectRef idx="1">
+                  <a:schemeClr val="accent5"/>
+                </a:effectRef>
+                <a:fontRef idx="minor">
+                  <a:schemeClr val="dk1"/>
+                </a:fontRef>
+              </p:style>
+              <p:txBody>
+                <a:bodyPr rtlCol="0" anchor="ctr"/>
+                <a:lstStyle/>
+                <a:p>
+                  <a:pPr algn="ctr"/>
+                  <a:endParaRPr lang="en-GB" sz="1200">
+                    <a:solidFill>
+                      <a:schemeClr val="dk1"/>
+                    </a:solidFill>
+                  </a:endParaRPr>
+                </a:p>
+              </p:txBody>
+            </p:sp>
+          </p:grpSp>
+          <p:sp>
+            <p:nvSpPr>
+              <p:cNvPr id="68" name="Rettangolo 67">
+                <a:extLst>
+                  <a:ext uri="{FF2B5EF4-FFF2-40B4-BE49-F238E27FC236}">
+                    <a16:creationId xmlns:a16="http://schemas.microsoft.com/office/drawing/2014/main" id="{8B74C966-A014-4EC8-8DD0-DB6D891EF2F2}"/>
+                  </a:ext>
+                </a:extLst>
+              </p:cNvPr>
+              <p:cNvSpPr/>
+              <p:nvPr/>
+            </p:nvSpPr>
+            <p:spPr>
+              <a:xfrm>
+                <a:off x="2635583" y="2458538"/>
+                <a:ext cx="1215141" cy="369332"/>
+              </a:xfrm>
+              <a:prstGeom prst="rect">
+                <a:avLst/>
+              </a:prstGeom>
+            </p:spPr>
+            <p:txBody>
+              <a:bodyPr wrap="none">
+                <a:spAutoFit/>
+              </a:bodyPr>
+              <a:lstStyle/>
+              <a:p>
+                <a:r>
+                  <a:rPr lang="en-GB" dirty="0" err="1"/>
+                  <a:t>waiterlogic</a:t>
+                </a:r>
+                <a:endParaRPr lang="en-GB" dirty="0"/>
+              </a:p>
+            </p:txBody>
+          </p:sp>
+        </p:grpSp>
+        <p:grpSp>
+          <p:nvGrpSpPr>
+            <p:cNvPr id="73" name="Gruppo 72">
+              <a:extLst>
+                <a:ext uri="{FF2B5EF4-FFF2-40B4-BE49-F238E27FC236}">
+                  <a16:creationId xmlns:a16="http://schemas.microsoft.com/office/drawing/2014/main" id="{21748BA0-D787-441F-A9E3-219B9685F26F}"/>
+                </a:ext>
+              </a:extLst>
+            </p:cNvPr>
+            <p:cNvGrpSpPr/>
+            <p:nvPr/>
+          </p:nvGrpSpPr>
+          <p:grpSpPr>
+            <a:xfrm>
+              <a:off x="3190402" y="4536529"/>
+              <a:ext cx="1696867" cy="1164750"/>
+              <a:chOff x="6349393" y="1966105"/>
+              <a:chExt cx="1696867" cy="1164750"/>
+            </a:xfrm>
+          </p:grpSpPr>
+          <p:sp>
+            <p:nvSpPr>
+              <p:cNvPr id="74" name="Triangolo isoscele 73">
+                <a:extLst>
+                  <a:ext uri="{FF2B5EF4-FFF2-40B4-BE49-F238E27FC236}">
+                    <a16:creationId xmlns:a16="http://schemas.microsoft.com/office/drawing/2014/main" id="{29B34CE7-13D0-489C-B532-5ACE7996F2F0}"/>
+                  </a:ext>
+                </a:extLst>
+              </p:cNvPr>
+              <p:cNvSpPr/>
+              <p:nvPr/>
+            </p:nvSpPr>
+            <p:spPr>
+              <a:xfrm rot="5400000">
+                <a:off x="7109709" y="2134974"/>
+                <a:ext cx="998084" cy="875019"/>
+              </a:xfrm>
+              <a:prstGeom prst="triangle">
+                <a:avLst/>
+              </a:prstGeom>
+              <a:solidFill>
+                <a:srgbClr val="CCFF66"/>
+              </a:solidFill>
+              <a:ln/>
+            </p:spPr>
+            <p:style>
+              <a:lnRef idx="1">
+                <a:schemeClr val="accent5"/>
+              </a:lnRef>
+              <a:fillRef idx="2">
+                <a:schemeClr val="accent5"/>
+              </a:fillRef>
+              <a:effectRef idx="1">
+                <a:schemeClr val="accent5"/>
+              </a:effectRef>
+              <a:fontRef idx="minor">
+                <a:schemeClr val="dk1"/>
+              </a:fontRef>
+            </p:style>
+            <p:txBody>
+              <a:bodyPr rtlCol="0" anchor="ctr"/>
+              <a:lstStyle/>
+              <a:p>
+                <a:pPr algn="ctr"/>
+                <a:endParaRPr lang="en-GB" sz="1200">
+                  <a:solidFill>
+                    <a:schemeClr val="dk1"/>
+                  </a:solidFill>
+                </a:endParaRPr>
+              </a:p>
+            </p:txBody>
+          </p:sp>
+          <p:sp>
+            <p:nvSpPr>
+              <p:cNvPr id="75" name="Ovale 38">
+                <a:extLst>
+                  <a:ext uri="{FF2B5EF4-FFF2-40B4-BE49-F238E27FC236}">
+                    <a16:creationId xmlns:a16="http://schemas.microsoft.com/office/drawing/2014/main" id="{DC93A049-566F-4656-B791-D2028C6183A8}"/>
+                  </a:ext>
+                </a:extLst>
+              </p:cNvPr>
+              <p:cNvSpPr/>
+              <p:nvPr/>
+            </p:nvSpPr>
+            <p:spPr>
+              <a:xfrm>
+                <a:off x="6538826" y="1966105"/>
+                <a:ext cx="1219751" cy="1164750"/>
+              </a:xfrm>
+              <a:prstGeom prst="ellipse">
+                <a:avLst/>
+              </a:prstGeom>
+              <a:solidFill>
+                <a:srgbClr val="FFCCFF"/>
+              </a:solidFill>
+              <a:ln/>
+            </p:spPr>
+            <p:style>
+              <a:lnRef idx="1">
+                <a:schemeClr val="accent5"/>
+              </a:lnRef>
+              <a:fillRef idx="2">
+                <a:schemeClr val="accent5"/>
+              </a:fillRef>
+              <a:effectRef idx="1">
+                <a:schemeClr val="accent5"/>
+              </a:effectRef>
+              <a:fontRef idx="minor">
+                <a:schemeClr val="dk1"/>
+              </a:fontRef>
+            </p:style>
+            <p:txBody>
+              <a:bodyPr rtlCol="0" anchor="ctr"/>
+              <a:lstStyle/>
+              <a:p>
+                <a:pPr algn="ctr"/>
+                <a:r>
+                  <a:rPr lang="en-GB" sz="1200" dirty="0"/>
+                  <a:t> </a:t>
+                </a:r>
+              </a:p>
+            </p:txBody>
+          </p:sp>
+          <p:sp>
+            <p:nvSpPr>
+              <p:cNvPr id="76" name="Rettangolo 39">
+                <a:extLst>
+                  <a:ext uri="{FF2B5EF4-FFF2-40B4-BE49-F238E27FC236}">
+                    <a16:creationId xmlns:a16="http://schemas.microsoft.com/office/drawing/2014/main" id="{DEBF7A12-B298-465A-8B3E-A2D4880553D8}"/>
+                  </a:ext>
+                </a:extLst>
+              </p:cNvPr>
+              <p:cNvSpPr/>
+              <p:nvPr/>
+            </p:nvSpPr>
+            <p:spPr>
+              <a:xfrm>
+                <a:off x="6349393" y="2352246"/>
+                <a:ext cx="457875" cy="342838"/>
+              </a:xfrm>
+              <a:prstGeom prst="rect">
+                <a:avLst/>
+              </a:prstGeom>
+              <a:solidFill>
+                <a:srgbClr val="FFCCFF"/>
+              </a:solidFill>
+              <a:ln/>
+            </p:spPr>
+            <p:style>
+              <a:lnRef idx="1">
+                <a:schemeClr val="accent5"/>
+              </a:lnRef>
+              <a:fillRef idx="2">
+                <a:schemeClr val="accent5"/>
+              </a:fillRef>
+              <a:effectRef idx="1">
+                <a:schemeClr val="accent5"/>
+              </a:effectRef>
+              <a:fontRef idx="minor">
+                <a:schemeClr val="dk1"/>
+              </a:fontRef>
+            </p:style>
+            <p:txBody>
+              <a:bodyPr rtlCol="0" anchor="ctr"/>
+              <a:lstStyle/>
+              <a:p>
+                <a:pPr algn="ctr"/>
+                <a:endParaRPr lang="en-GB" sz="1200"/>
+              </a:p>
+            </p:txBody>
+          </p:sp>
+          <p:sp>
+            <p:nvSpPr>
+              <p:cNvPr id="77" name="Rettangolo 76">
+                <a:extLst>
+                  <a:ext uri="{FF2B5EF4-FFF2-40B4-BE49-F238E27FC236}">
+                    <a16:creationId xmlns:a16="http://schemas.microsoft.com/office/drawing/2014/main" id="{BD2C7552-E6BC-4B47-BCB9-A8A8F654E835}"/>
+                  </a:ext>
+                </a:extLst>
+              </p:cNvPr>
+              <p:cNvSpPr/>
+              <p:nvPr/>
+            </p:nvSpPr>
+            <p:spPr>
+              <a:xfrm>
+                <a:off x="6755579" y="2350735"/>
+                <a:ext cx="914033" cy="369332"/>
+              </a:xfrm>
+              <a:prstGeom prst="rect">
+                <a:avLst/>
+              </a:prstGeom>
+            </p:spPr>
+            <p:txBody>
+              <a:bodyPr wrap="none">
+                <a:spAutoFit/>
+              </a:bodyPr>
+              <a:lstStyle/>
+              <a:p>
+                <a:pPr algn="ctr"/>
+                <a:r>
+                  <a:rPr lang="en-GB" dirty="0"/>
+                  <a:t>barman</a:t>
+                </a:r>
+              </a:p>
+            </p:txBody>
+          </p:sp>
+        </p:grpSp>
+        <p:cxnSp>
+          <p:nvCxnSpPr>
+            <p:cNvPr id="78" name="Connettore 2 92">
+              <a:extLst>
+                <a:ext uri="{FF2B5EF4-FFF2-40B4-BE49-F238E27FC236}">
+                  <a16:creationId xmlns:a16="http://schemas.microsoft.com/office/drawing/2014/main" id="{4EDA6F7A-254C-45F8-B841-C06E105A1B3D}"/>
+                </a:ext>
+              </a:extLst>
+            </p:cNvPr>
+            <p:cNvCxnSpPr>
+              <a:cxnSpLocks/>
+            </p:cNvCxnSpPr>
+            <p:nvPr/>
+          </p:nvCxnSpPr>
+          <p:spPr>
+            <a:xfrm>
+              <a:off x="3318203" y="3192607"/>
+              <a:ext cx="0" cy="1343922"/>
+            </a:xfrm>
+            <a:prstGeom prst="straightConnector1">
+              <a:avLst/>
+            </a:prstGeom>
+            <a:ln>
+              <a:prstDash val="lgDash"/>
+              <a:tailEnd type="arrow"/>
+            </a:ln>
+          </p:spPr>
+          <p:style>
+            <a:lnRef idx="1">
+              <a:schemeClr val="accent1"/>
+            </a:lnRef>
+            <a:fillRef idx="0">
+              <a:schemeClr val="accent1"/>
+            </a:fillRef>
+            <a:effectRef idx="0">
+              <a:schemeClr val="accent1"/>
+            </a:effectRef>
+            <a:fontRef idx="minor">
+              <a:schemeClr val="tx1"/>
+            </a:fontRef>
+          </p:style>
+        </p:cxnSp>
+        <p:cxnSp>
+          <p:nvCxnSpPr>
+            <p:cNvPr id="79" name="Connettore 2 92">
+              <a:extLst>
+                <a:ext uri="{FF2B5EF4-FFF2-40B4-BE49-F238E27FC236}">
+                  <a16:creationId xmlns:a16="http://schemas.microsoft.com/office/drawing/2014/main" id="{8624D2CD-40A5-47CF-8388-63CDDD73EA2B}"/>
+                </a:ext>
+              </a:extLst>
+            </p:cNvPr>
+            <p:cNvCxnSpPr>
+              <a:cxnSpLocks/>
+            </p:cNvCxnSpPr>
+            <p:nvPr/>
+          </p:nvCxnSpPr>
+          <p:spPr>
+            <a:xfrm flipV="1">
+              <a:off x="4449759" y="3272663"/>
+              <a:ext cx="0" cy="1195122"/>
+            </a:xfrm>
+            <a:prstGeom prst="straightConnector1">
+              <a:avLst/>
+            </a:prstGeom>
+            <a:ln>
+              <a:prstDash val="lgDash"/>
+              <a:tailEnd type="arrow"/>
+            </a:ln>
+          </p:spPr>
+          <p:style>
+            <a:lnRef idx="1">
+              <a:schemeClr val="accent1"/>
+            </a:lnRef>
+            <a:fillRef idx="0">
+              <a:schemeClr val="accent1"/>
+            </a:fillRef>
+            <a:effectRef idx="0">
+              <a:schemeClr val="accent1"/>
+            </a:effectRef>
+            <a:fontRef idx="minor">
+              <a:schemeClr val="tx1"/>
+            </a:fontRef>
+          </p:style>
+        </p:cxnSp>
+        <p:sp>
+          <p:nvSpPr>
+            <p:cNvPr id="80" name="CasellaDiTesto 79">
+              <a:extLst>
+                <a:ext uri="{FF2B5EF4-FFF2-40B4-BE49-F238E27FC236}">
+                  <a16:creationId xmlns:a16="http://schemas.microsoft.com/office/drawing/2014/main" id="{2B26B760-F82A-4B49-BC34-9A7ADAAA6FB9}"/>
+                </a:ext>
+              </a:extLst>
+            </p:cNvPr>
+            <p:cNvSpPr txBox="1"/>
+            <p:nvPr/>
+          </p:nvSpPr>
+          <p:spPr>
+            <a:xfrm>
+              <a:off x="1673866" y="3774710"/>
+              <a:ext cx="1555333" cy="357056"/>
+            </a:xfrm>
+            <a:prstGeom prst="rect">
+              <a:avLst/>
+            </a:prstGeom>
+            <a:noFill/>
+          </p:spPr>
+          <p:txBody>
+            <a:bodyPr wrap="square" rtlCol="0">
+              <a:spAutoFit/>
+            </a:bodyPr>
+            <a:lstStyle/>
+            <a:p>
+              <a:r>
+                <a:rPr lang="it-IT" sz="1400" dirty="0" err="1"/>
+                <a:t>order</a:t>
+              </a:r>
+              <a:r>
+                <a:rPr lang="it-IT" sz="1400" dirty="0"/>
+                <a:t>(CID, TEA)</a:t>
+              </a:r>
+            </a:p>
+          </p:txBody>
+        </p:sp>
+        <p:sp>
+          <p:nvSpPr>
+            <p:cNvPr id="81" name="CasellaDiTesto 80">
+              <a:extLst>
+                <a:ext uri="{FF2B5EF4-FFF2-40B4-BE49-F238E27FC236}">
+                  <a16:creationId xmlns:a16="http://schemas.microsoft.com/office/drawing/2014/main" id="{C1C4CD57-2751-4FDA-B6AF-50A6320CD307}"/>
+                </a:ext>
+              </a:extLst>
+            </p:cNvPr>
+            <p:cNvSpPr txBox="1"/>
+            <p:nvPr/>
+          </p:nvSpPr>
+          <p:spPr>
+            <a:xfrm>
+              <a:off x="4581880" y="3981537"/>
+              <a:ext cx="2051408" cy="364461"/>
+            </a:xfrm>
+            <a:prstGeom prst="rect">
+              <a:avLst/>
+            </a:prstGeom>
+            <a:noFill/>
+          </p:spPr>
+          <p:txBody>
+            <a:bodyPr wrap="square" rtlCol="0">
+              <a:spAutoFit/>
+            </a:bodyPr>
+            <a:lstStyle/>
+            <a:p>
+              <a:r>
+                <a:rPr lang="it-IT" sz="1400" dirty="0" err="1"/>
+                <a:t>orderReady</a:t>
+              </a:r>
+              <a:r>
+                <a:rPr lang="it-IT" sz="1400" dirty="0"/>
+                <a:t>(CID, TEA)</a:t>
+              </a:r>
+            </a:p>
+          </p:txBody>
+        </p:sp>
+        <p:grpSp>
+          <p:nvGrpSpPr>
+            <p:cNvPr id="82" name="Gruppo 81">
+              <a:extLst>
+                <a:ext uri="{FF2B5EF4-FFF2-40B4-BE49-F238E27FC236}">
+                  <a16:creationId xmlns:a16="http://schemas.microsoft.com/office/drawing/2014/main" id="{A3A759A8-2595-47AF-933C-7BB59D223D4A}"/>
+                </a:ext>
+              </a:extLst>
+            </p:cNvPr>
+            <p:cNvGrpSpPr/>
+            <p:nvPr/>
+          </p:nvGrpSpPr>
+          <p:grpSpPr>
+            <a:xfrm>
+              <a:off x="113085" y="2027857"/>
+              <a:ext cx="1696867" cy="1164750"/>
+              <a:chOff x="2680234" y="3945052"/>
+              <a:chExt cx="1696867" cy="1164750"/>
+            </a:xfrm>
+          </p:grpSpPr>
+          <p:sp>
+            <p:nvSpPr>
+              <p:cNvPr id="83" name="Triangolo isoscele 82">
+                <a:extLst>
+                  <a:ext uri="{FF2B5EF4-FFF2-40B4-BE49-F238E27FC236}">
+                    <a16:creationId xmlns:a16="http://schemas.microsoft.com/office/drawing/2014/main" id="{783A867A-8040-4874-BD23-E9BB230585C8}"/>
+                  </a:ext>
+                </a:extLst>
+              </p:cNvPr>
+              <p:cNvSpPr/>
+              <p:nvPr/>
+            </p:nvSpPr>
+            <p:spPr>
+              <a:xfrm rot="5400000">
+                <a:off x="3440550" y="4113921"/>
+                <a:ext cx="998084" cy="875019"/>
+              </a:xfrm>
+              <a:prstGeom prst="triangle">
+                <a:avLst/>
+              </a:prstGeom>
+              <a:solidFill>
+                <a:srgbClr val="CCFF66"/>
+              </a:solidFill>
+              <a:ln/>
+            </p:spPr>
+            <p:style>
+              <a:lnRef idx="1">
+                <a:schemeClr val="accent5"/>
+              </a:lnRef>
+              <a:fillRef idx="2">
+                <a:schemeClr val="accent5"/>
+              </a:fillRef>
+              <a:effectRef idx="1">
+                <a:schemeClr val="accent5"/>
+              </a:effectRef>
+              <a:fontRef idx="minor">
+                <a:schemeClr val="dk1"/>
+              </a:fontRef>
+            </p:style>
+            <p:txBody>
+              <a:bodyPr rtlCol="0" anchor="ctr"/>
+              <a:lstStyle/>
+              <a:p>
+                <a:pPr algn="ctr"/>
+                <a:endParaRPr lang="en-GB" sz="1200">
+                  <a:solidFill>
+                    <a:schemeClr val="dk1"/>
+                  </a:solidFill>
+                </a:endParaRPr>
+              </a:p>
+            </p:txBody>
+          </p:sp>
+          <p:sp>
+            <p:nvSpPr>
+              <p:cNvPr id="84" name="Ovale 83">
+                <a:extLst>
+                  <a:ext uri="{FF2B5EF4-FFF2-40B4-BE49-F238E27FC236}">
+                    <a16:creationId xmlns:a16="http://schemas.microsoft.com/office/drawing/2014/main" id="{4C76E5BA-F4FE-4150-9110-96149E41843B}"/>
+                  </a:ext>
+                </a:extLst>
+              </p:cNvPr>
+              <p:cNvSpPr/>
+              <p:nvPr/>
+            </p:nvSpPr>
+            <p:spPr>
+              <a:xfrm>
+                <a:off x="2869667" y="3945052"/>
+                <a:ext cx="1219751" cy="1164750"/>
+              </a:xfrm>
+              <a:prstGeom prst="ellipse">
+                <a:avLst/>
+              </a:prstGeom>
+              <a:solidFill>
+                <a:srgbClr val="FFCCFF"/>
+              </a:solidFill>
+              <a:ln/>
+            </p:spPr>
+            <p:style>
+              <a:lnRef idx="1">
+                <a:schemeClr val="accent5"/>
+              </a:lnRef>
+              <a:fillRef idx="2">
+                <a:schemeClr val="accent5"/>
+              </a:fillRef>
+              <a:effectRef idx="1">
+                <a:schemeClr val="accent5"/>
+              </a:effectRef>
+              <a:fontRef idx="minor">
+                <a:schemeClr val="dk1"/>
+              </a:fontRef>
+            </p:style>
+            <p:txBody>
+              <a:bodyPr rtlCol="0" anchor="ctr"/>
+              <a:lstStyle/>
+              <a:p>
+                <a:pPr algn="ctr"/>
+                <a:r>
+                  <a:rPr lang="en-GB" sz="1200" dirty="0"/>
+                  <a:t> </a:t>
+                </a:r>
+              </a:p>
+            </p:txBody>
+          </p:sp>
+          <p:sp>
+            <p:nvSpPr>
+              <p:cNvPr id="85" name="Rettangolo 84">
+                <a:extLst>
+                  <a:ext uri="{FF2B5EF4-FFF2-40B4-BE49-F238E27FC236}">
+                    <a16:creationId xmlns:a16="http://schemas.microsoft.com/office/drawing/2014/main" id="{8AB8975A-076B-4965-B9B8-AFB0D1523FA7}"/>
+                  </a:ext>
+                </a:extLst>
+              </p:cNvPr>
+              <p:cNvSpPr/>
+              <p:nvPr/>
+            </p:nvSpPr>
+            <p:spPr>
+              <a:xfrm>
+                <a:off x="2680234" y="4331193"/>
+                <a:ext cx="457875" cy="342838"/>
+              </a:xfrm>
+              <a:prstGeom prst="rect">
+                <a:avLst/>
+              </a:prstGeom>
+              <a:solidFill>
+                <a:srgbClr val="FFCCFF"/>
+              </a:solidFill>
+              <a:ln/>
+            </p:spPr>
+            <p:style>
+              <a:lnRef idx="1">
+                <a:schemeClr val="accent5"/>
+              </a:lnRef>
+              <a:fillRef idx="2">
+                <a:schemeClr val="accent5"/>
+              </a:fillRef>
+              <a:effectRef idx="1">
+                <a:schemeClr val="accent5"/>
+              </a:effectRef>
+              <a:fontRef idx="minor">
+                <a:schemeClr val="dk1"/>
+              </a:fontRef>
+            </p:style>
+            <p:txBody>
+              <a:bodyPr rtlCol="0" anchor="ctr"/>
+              <a:lstStyle/>
+              <a:p>
+                <a:pPr algn="ctr"/>
+                <a:endParaRPr lang="en-GB" sz="1200"/>
+              </a:p>
+            </p:txBody>
+          </p:sp>
+          <p:sp>
+            <p:nvSpPr>
+              <p:cNvPr id="86" name="Rettangolo 85">
+                <a:extLst>
+                  <a:ext uri="{FF2B5EF4-FFF2-40B4-BE49-F238E27FC236}">
+                    <a16:creationId xmlns:a16="http://schemas.microsoft.com/office/drawing/2014/main" id="{48CEDC13-9A93-4D49-8F4D-10E19C4A7751}"/>
+                  </a:ext>
+                </a:extLst>
+              </p:cNvPr>
+              <p:cNvSpPr/>
+              <p:nvPr/>
+            </p:nvSpPr>
+            <p:spPr>
+              <a:xfrm>
+                <a:off x="2896801" y="4329682"/>
+                <a:ext cx="1069524" cy="369332"/>
+              </a:xfrm>
+              <a:prstGeom prst="rect">
+                <a:avLst/>
+              </a:prstGeom>
+            </p:spPr>
+            <p:txBody>
+              <a:bodyPr wrap="none">
+                <a:spAutoFit/>
+              </a:bodyPr>
+              <a:lstStyle/>
+              <a:p>
+                <a:r>
+                  <a:rPr lang="en-GB" dirty="0" err="1"/>
+                  <a:t>smartbell</a:t>
+                </a:r>
+                <a:endParaRPr lang="en-GB" dirty="0"/>
+              </a:p>
+            </p:txBody>
+          </p:sp>
+        </p:grpSp>
+        <p:grpSp>
+          <p:nvGrpSpPr>
+            <p:cNvPr id="87" name="Gruppo 56">
+              <a:extLst>
+                <a:ext uri="{FF2B5EF4-FFF2-40B4-BE49-F238E27FC236}">
+                  <a16:creationId xmlns:a16="http://schemas.microsoft.com/office/drawing/2014/main" id="{FD166AAE-ADDF-4C41-AD90-97121041EA35}"/>
+                </a:ext>
+              </a:extLst>
+            </p:cNvPr>
+            <p:cNvGrpSpPr/>
+            <p:nvPr/>
+          </p:nvGrpSpPr>
+          <p:grpSpPr>
+            <a:xfrm>
+              <a:off x="1638152" y="2294225"/>
+              <a:ext cx="1594842" cy="118262"/>
+              <a:chOff x="4586473" y="4245346"/>
+              <a:chExt cx="667405" cy="86434"/>
+            </a:xfrm>
+          </p:grpSpPr>
+          <p:sp>
+            <p:nvSpPr>
+              <p:cNvPr id="88" name="Freccia a destra 58">
+                <a:extLst>
+                  <a:ext uri="{FF2B5EF4-FFF2-40B4-BE49-F238E27FC236}">
+                    <a16:creationId xmlns:a16="http://schemas.microsoft.com/office/drawing/2014/main" id="{65BBD38F-B94A-4E07-92CC-C3A0B22E27E4}"/>
+                  </a:ext>
+                </a:extLst>
+              </p:cNvPr>
+              <p:cNvSpPr/>
+              <p:nvPr/>
+            </p:nvSpPr>
+            <p:spPr>
+              <a:xfrm>
+                <a:off x="4586473" y="4251518"/>
+                <a:ext cx="577147" cy="80262"/>
+              </a:xfrm>
+              <a:prstGeom prst="rightArrow">
+                <a:avLst/>
+              </a:prstGeom>
+            </p:spPr>
+            <p:style>
+              <a:lnRef idx="1">
+                <a:schemeClr val="accent1"/>
+              </a:lnRef>
+              <a:fillRef idx="2">
+                <a:schemeClr val="accent1"/>
+              </a:fillRef>
+              <a:effectRef idx="1">
+                <a:schemeClr val="accent1"/>
+              </a:effectRef>
+              <a:fontRef idx="minor">
+                <a:schemeClr val="dk1"/>
+              </a:fontRef>
+            </p:style>
+            <p:txBody>
+              <a:bodyPr rtlCol="0" anchor="ctr"/>
+              <a:lstStyle/>
+              <a:p>
+                <a:pPr algn="ctr"/>
+                <a:endParaRPr lang="en-GB"/>
+              </a:p>
+            </p:txBody>
+          </p:sp>
+          <p:sp>
+            <p:nvSpPr>
+              <p:cNvPr id="89" name="Triangolo isoscele 76">
+                <a:extLst>
+                  <a:ext uri="{FF2B5EF4-FFF2-40B4-BE49-F238E27FC236}">
+                    <a16:creationId xmlns:a16="http://schemas.microsoft.com/office/drawing/2014/main" id="{0AA122CA-3A58-49EF-8394-DD42E9328AAD}"/>
+                  </a:ext>
+                </a:extLst>
+              </p:cNvPr>
+              <p:cNvSpPr/>
+              <p:nvPr/>
+            </p:nvSpPr>
+            <p:spPr>
+              <a:xfrm rot="5400000" flipH="1">
+                <a:off x="5141030" y="4218931"/>
+                <a:ext cx="86434" cy="139263"/>
+              </a:xfrm>
+              <a:prstGeom prst="triangle">
+                <a:avLst/>
+              </a:prstGeom>
+              <a:solidFill>
+                <a:schemeClr val="bg1"/>
+              </a:solidFill>
+              <a:ln/>
+            </p:spPr>
+            <p:style>
+              <a:lnRef idx="1">
+                <a:schemeClr val="accent5"/>
+              </a:lnRef>
+              <a:fillRef idx="2">
+                <a:schemeClr val="accent5"/>
+              </a:fillRef>
+              <a:effectRef idx="1">
+                <a:schemeClr val="accent5"/>
+              </a:effectRef>
+              <a:fontRef idx="minor">
+                <a:schemeClr val="dk1"/>
+              </a:fontRef>
+            </p:style>
+            <p:txBody>
+              <a:bodyPr rtlCol="0" anchor="ctr"/>
+              <a:lstStyle/>
+              <a:p>
+                <a:pPr algn="ctr"/>
+                <a:endParaRPr lang="en-GB" sz="1200">
+                  <a:solidFill>
+                    <a:schemeClr val="dk1"/>
+                  </a:solidFill>
+                </a:endParaRPr>
+              </a:p>
+            </p:txBody>
+          </p:sp>
+        </p:grpSp>
+        <p:grpSp>
+          <p:nvGrpSpPr>
+            <p:cNvPr id="90" name="Gruppo 87">
+              <a:extLst>
+                <a:ext uri="{FF2B5EF4-FFF2-40B4-BE49-F238E27FC236}">
+                  <a16:creationId xmlns:a16="http://schemas.microsoft.com/office/drawing/2014/main" id="{DEC90801-4A51-4634-9C34-40CE0643111D}"/>
+                </a:ext>
+              </a:extLst>
+            </p:cNvPr>
+            <p:cNvGrpSpPr/>
+            <p:nvPr/>
+          </p:nvGrpSpPr>
+          <p:grpSpPr>
+            <a:xfrm>
+              <a:off x="1596206" y="2858033"/>
+              <a:ext cx="1600507" cy="170634"/>
+              <a:chOff x="4592177" y="4419530"/>
+              <a:chExt cx="666895" cy="86434"/>
+            </a:xfrm>
+          </p:grpSpPr>
+          <p:cxnSp>
+            <p:nvCxnSpPr>
+              <p:cNvPr id="91" name="Connettore 1 89">
+                <a:extLst>
+                  <a:ext uri="{FF2B5EF4-FFF2-40B4-BE49-F238E27FC236}">
+                    <a16:creationId xmlns:a16="http://schemas.microsoft.com/office/drawing/2014/main" id="{878E60D4-38CD-42F8-93FC-9D04BA3DC61B}"/>
+                  </a:ext>
+                </a:extLst>
+              </p:cNvPr>
+              <p:cNvCxnSpPr/>
+              <p:nvPr/>
+            </p:nvCxnSpPr>
+            <p:spPr>
+              <a:xfrm>
+                <a:off x="4611000" y="4462747"/>
+                <a:ext cx="648072" cy="0"/>
+              </a:xfrm>
+              <a:prstGeom prst="line">
+                <a:avLst/>
+              </a:prstGeom>
+              <a:ln>
+                <a:prstDash val="dash"/>
+              </a:ln>
+            </p:spPr>
+            <p:style>
+              <a:lnRef idx="1">
+                <a:schemeClr val="accent1"/>
+              </a:lnRef>
+              <a:fillRef idx="0">
+                <a:schemeClr val="accent1"/>
+              </a:fillRef>
+              <a:effectRef idx="0">
+                <a:schemeClr val="accent1"/>
+              </a:effectRef>
+              <a:fontRef idx="minor">
+                <a:schemeClr val="tx1"/>
+              </a:fontRef>
+            </p:style>
+          </p:cxnSp>
+          <p:sp>
+            <p:nvSpPr>
+              <p:cNvPr id="92" name="Triangolo isoscele 90">
+                <a:extLst>
+                  <a:ext uri="{FF2B5EF4-FFF2-40B4-BE49-F238E27FC236}">
+                    <a16:creationId xmlns:a16="http://schemas.microsoft.com/office/drawing/2014/main" id="{3CFD54EC-77F1-4ACF-8DBC-AEB17C8B9D9E}"/>
+                  </a:ext>
+                </a:extLst>
+              </p:cNvPr>
+              <p:cNvSpPr/>
+              <p:nvPr/>
+            </p:nvSpPr>
+            <p:spPr>
+              <a:xfrm rot="16200000">
+                <a:off x="4618592" y="4393115"/>
+                <a:ext cx="86434" cy="139263"/>
+              </a:xfrm>
+              <a:prstGeom prst="triangle">
+                <a:avLst/>
+              </a:prstGeom>
+              <a:solidFill>
+                <a:schemeClr val="bg1"/>
+              </a:solidFill>
+              <a:ln/>
+            </p:spPr>
+            <p:style>
+              <a:lnRef idx="1">
+                <a:schemeClr val="accent5"/>
+              </a:lnRef>
+              <a:fillRef idx="2">
+                <a:schemeClr val="accent5"/>
+              </a:fillRef>
+              <a:effectRef idx="1">
+                <a:schemeClr val="accent5"/>
+              </a:effectRef>
+              <a:fontRef idx="minor">
+                <a:schemeClr val="dk1"/>
+              </a:fontRef>
+            </p:style>
+            <p:txBody>
+              <a:bodyPr rtlCol="0" anchor="ctr"/>
+              <a:lstStyle/>
+              <a:p>
+                <a:pPr algn="ctr"/>
+                <a:endParaRPr lang="en-GB" sz="1200"/>
+              </a:p>
+            </p:txBody>
+          </p:sp>
+        </p:grpSp>
+        <p:sp>
+          <p:nvSpPr>
+            <p:cNvPr id="93" name="CasellaDiTesto 92">
+              <a:extLst>
+                <a:ext uri="{FF2B5EF4-FFF2-40B4-BE49-F238E27FC236}">
+                  <a16:creationId xmlns:a16="http://schemas.microsoft.com/office/drawing/2014/main" id="{018F263B-E458-4C9C-AC30-68C64E80272C}"/>
+                </a:ext>
+              </a:extLst>
+            </p:cNvPr>
+            <p:cNvSpPr txBox="1"/>
+            <p:nvPr/>
+          </p:nvSpPr>
+          <p:spPr>
+            <a:xfrm>
+              <a:off x="1658319" y="1854050"/>
+              <a:ext cx="1532086" cy="307777"/>
+            </a:xfrm>
+            <a:prstGeom prst="rect">
+              <a:avLst/>
+            </a:prstGeom>
+            <a:noFill/>
+          </p:spPr>
+          <p:txBody>
+            <a:bodyPr wrap="none" rtlCol="0">
+              <a:spAutoFit/>
+            </a:bodyPr>
+            <a:lstStyle/>
+            <a:p>
+              <a:r>
+                <a:rPr lang="it-IT" sz="1400" dirty="0" err="1"/>
+                <a:t>enterRequest</a:t>
+              </a:r>
+              <a:r>
+                <a:rPr lang="it-IT" sz="1400" dirty="0"/>
+                <a:t>(CID)</a:t>
+              </a:r>
+            </a:p>
+          </p:txBody>
+        </p:sp>
+        <p:sp>
+          <p:nvSpPr>
+            <p:cNvPr id="94" name="CasellaDiTesto 93">
+              <a:extLst>
+                <a:ext uri="{FF2B5EF4-FFF2-40B4-BE49-F238E27FC236}">
+                  <a16:creationId xmlns:a16="http://schemas.microsoft.com/office/drawing/2014/main" id="{00D2B03B-1F27-4EDB-8C00-B2C2F705E9E2}"/>
+                </a:ext>
+              </a:extLst>
+            </p:cNvPr>
+            <p:cNvSpPr txBox="1"/>
+            <p:nvPr/>
+          </p:nvSpPr>
+          <p:spPr>
+            <a:xfrm>
+              <a:off x="1836181" y="3063535"/>
+              <a:ext cx="1361757" cy="357056"/>
+            </a:xfrm>
+            <a:prstGeom prst="rect">
+              <a:avLst/>
+            </a:prstGeom>
+            <a:noFill/>
+          </p:spPr>
+          <p:txBody>
+            <a:bodyPr wrap="square" rtlCol="0">
+              <a:spAutoFit/>
+            </a:bodyPr>
+            <a:lstStyle/>
+            <a:p>
+              <a:r>
+                <a:rPr lang="it-IT" sz="1400" dirty="0" err="1"/>
+                <a:t>answer</a:t>
+              </a:r>
+              <a:r>
+                <a:rPr lang="it-IT" sz="1400" dirty="0"/>
+                <a:t>(TIME)</a:t>
+              </a:r>
+            </a:p>
+          </p:txBody>
+        </p:sp>
+        <p:sp>
+          <p:nvSpPr>
+            <p:cNvPr id="108" name="Triangolo isoscele 42">
+              <a:extLst>
+                <a:ext uri="{FF2B5EF4-FFF2-40B4-BE49-F238E27FC236}">
+                  <a16:creationId xmlns:a16="http://schemas.microsoft.com/office/drawing/2014/main" id="{CB9B48A2-F0F4-44EB-B980-133664DE369B}"/>
+                </a:ext>
+              </a:extLst>
+            </p:cNvPr>
+            <p:cNvSpPr/>
+            <p:nvPr/>
+          </p:nvSpPr>
+          <p:spPr>
+            <a:xfrm rot="16200000">
+              <a:off x="3899982" y="4424403"/>
+              <a:ext cx="139809" cy="226573"/>
+            </a:xfrm>
+            <a:prstGeom prst="triangle">
+              <a:avLst/>
+            </a:prstGeom>
+            <a:solidFill>
+              <a:srgbClr val="FF0000"/>
+            </a:solidFill>
+            <a:ln/>
+          </p:spPr>
+          <p:style>
+            <a:lnRef idx="1">
+              <a:schemeClr val="accent5"/>
+            </a:lnRef>
+            <a:fillRef idx="2">
+              <a:schemeClr val="accent5"/>
+            </a:fillRef>
+            <a:effectRef idx="1">
+              <a:schemeClr val="accent5"/>
+            </a:effectRef>
+            <a:fontRef idx="minor">
+              <a:schemeClr val="dk1"/>
+            </a:fontRef>
+          </p:style>
+          <p:txBody>
+            <a:bodyPr rtlCol="0" anchor="ctr"/>
+            <a:lstStyle/>
+            <a:p>
+              <a:pPr algn="ctr"/>
+              <a:endParaRPr lang="en-GB" sz="1200">
+                <a:solidFill>
+                  <a:schemeClr val="dk1"/>
+                </a:solidFill>
+              </a:endParaRPr>
+            </a:p>
+          </p:txBody>
+        </p:sp>
+        <p:sp>
+          <p:nvSpPr>
+            <p:cNvPr id="109" name="Triangolo isoscele 42">
+              <a:extLst>
+                <a:ext uri="{FF2B5EF4-FFF2-40B4-BE49-F238E27FC236}">
+                  <a16:creationId xmlns:a16="http://schemas.microsoft.com/office/drawing/2014/main" id="{F4652558-4D51-4024-8AB8-37498F2320DD}"/>
+                </a:ext>
+              </a:extLst>
+            </p:cNvPr>
+            <p:cNvSpPr/>
+            <p:nvPr/>
+          </p:nvSpPr>
+          <p:spPr>
+            <a:xfrm rot="16200000">
+              <a:off x="738806" y="1923158"/>
+              <a:ext cx="139809" cy="226573"/>
+            </a:xfrm>
+            <a:prstGeom prst="triangle">
+              <a:avLst/>
+            </a:prstGeom>
+            <a:solidFill>
+              <a:srgbClr val="FF0000"/>
+            </a:solidFill>
+            <a:ln/>
+          </p:spPr>
+          <p:style>
+            <a:lnRef idx="1">
+              <a:schemeClr val="accent5"/>
+            </a:lnRef>
+            <a:fillRef idx="2">
+              <a:schemeClr val="accent5"/>
+            </a:fillRef>
+            <a:effectRef idx="1">
+              <a:schemeClr val="accent5"/>
+            </a:effectRef>
+            <a:fontRef idx="minor">
+              <a:schemeClr val="dk1"/>
+            </a:fontRef>
+          </p:style>
+          <p:txBody>
+            <a:bodyPr rtlCol="0" anchor="ctr"/>
+            <a:lstStyle/>
+            <a:p>
+              <a:pPr algn="ctr"/>
+              <a:endParaRPr lang="en-GB" sz="1200">
+                <a:solidFill>
+                  <a:schemeClr val="dk1"/>
+                </a:solidFill>
+              </a:endParaRPr>
+            </a:p>
+          </p:txBody>
+        </p:sp>
+      </p:grpSp>
+    </p:spTree>
+    <p:extLst>
+      <p:ext uri="{BB962C8B-B14F-4D97-AF65-F5344CB8AC3E}">
+        <p14:creationId xmlns:p14="http://schemas.microsoft.com/office/powerpoint/2010/main" val="3602317542"/>
+      </p:ext>
+    </p:extLst>
+  </p:cSld>
+  <p:clrMapOvr>
+    <a:masterClrMapping/>
+  </p:clrMapOvr>
+</p:sld>
+</file>
+
 <file path=ppt/theme/theme1.xml><?xml version="1.0" encoding="utf-8"?>
 <a:theme xmlns:a="http://schemas.openxmlformats.org/drawingml/2006/main" name="Tema di Office">
   <a:themeElements>

</xml_diff>